<commit_message>
update powerpoint w/ code logic
</commit_message>
<xml_diff>
--- a/Extra/pii - presentation.pptx
+++ b/Extra/pii - presentation.pptx
@@ -15,6 +15,13 @@
     <p:sldId id="260" r:id="rId9"/>
     <p:sldId id="261" r:id="rId10"/>
     <p:sldId id="262" r:id="rId11"/>
+    <p:sldId id="266" r:id="rId12"/>
+    <p:sldId id="268" r:id="rId13"/>
+    <p:sldId id="269" r:id="rId14"/>
+    <p:sldId id="270" r:id="rId15"/>
+    <p:sldId id="271" r:id="rId16"/>
+    <p:sldId id="272" r:id="rId17"/>
+    <p:sldId id="273" r:id="rId18"/>
   </p:sldIdLst>
   <p:sldSz cx="12192000" cy="6858000"/>
   <p:notesSz cx="6858000" cy="9144000"/>
@@ -138,6 +145,17 @@
             <p14:sldId id="262"/>
           </p14:sldIdLst>
         </p14:section>
+        <p14:section name="Logic" id="{9C6B92D7-5ABC-BA4E-8578-7FF2209B9423}">
+          <p14:sldIdLst>
+            <p14:sldId id="266"/>
+            <p14:sldId id="268"/>
+            <p14:sldId id="269"/>
+            <p14:sldId id="270"/>
+            <p14:sldId id="271"/>
+            <p14:sldId id="272"/>
+            <p14:sldId id="273"/>
+          </p14:sldIdLst>
+        </p14:section>
       </p14:sectionLst>
     </p:ext>
     <p:ext uri="{EFAFB233-063F-42B5-8137-9DF3F51BA10A}">
@@ -294,7 +312,7 @@
           <a:p>
             <a:fld id="{1962816C-FB9E-9847-8BA2-FF6C50A8E851}" type="datetimeFigureOut">
               <a:rPr lang="en-US" smtClean="0"/>
-              <a:t>2/5/23</a:t>
+              <a:t>2/11/23</a:t>
             </a:fld>
             <a:endParaRPr lang="en-US"/>
           </a:p>
@@ -492,7 +510,7 @@
           <a:p>
             <a:fld id="{1962816C-FB9E-9847-8BA2-FF6C50A8E851}" type="datetimeFigureOut">
               <a:rPr lang="en-US" smtClean="0"/>
-              <a:t>2/5/23</a:t>
+              <a:t>2/11/23</a:t>
             </a:fld>
             <a:endParaRPr lang="en-US"/>
           </a:p>
@@ -700,7 +718,7 @@
           <a:p>
             <a:fld id="{1962816C-FB9E-9847-8BA2-FF6C50A8E851}" type="datetimeFigureOut">
               <a:rPr lang="en-US" smtClean="0"/>
-              <a:t>2/5/23</a:t>
+              <a:t>2/11/23</a:t>
             </a:fld>
             <a:endParaRPr lang="en-US"/>
           </a:p>
@@ -898,7 +916,7 @@
           <a:p>
             <a:fld id="{1962816C-FB9E-9847-8BA2-FF6C50A8E851}" type="datetimeFigureOut">
               <a:rPr lang="en-US" smtClean="0"/>
-              <a:t>2/5/23</a:t>
+              <a:t>2/11/23</a:t>
             </a:fld>
             <a:endParaRPr lang="en-US"/>
           </a:p>
@@ -1173,7 +1191,7 @@
           <a:p>
             <a:fld id="{1962816C-FB9E-9847-8BA2-FF6C50A8E851}" type="datetimeFigureOut">
               <a:rPr lang="en-US" smtClean="0"/>
-              <a:t>2/5/23</a:t>
+              <a:t>2/11/23</a:t>
             </a:fld>
             <a:endParaRPr lang="en-US"/>
           </a:p>
@@ -1438,7 +1456,7 @@
           <a:p>
             <a:fld id="{1962816C-FB9E-9847-8BA2-FF6C50A8E851}" type="datetimeFigureOut">
               <a:rPr lang="en-US" smtClean="0"/>
-              <a:t>2/5/23</a:t>
+              <a:t>2/11/23</a:t>
             </a:fld>
             <a:endParaRPr lang="en-US"/>
           </a:p>
@@ -1850,7 +1868,7 @@
           <a:p>
             <a:fld id="{1962816C-FB9E-9847-8BA2-FF6C50A8E851}" type="datetimeFigureOut">
               <a:rPr lang="en-US" smtClean="0"/>
-              <a:t>2/5/23</a:t>
+              <a:t>2/11/23</a:t>
             </a:fld>
             <a:endParaRPr lang="en-US"/>
           </a:p>
@@ -1991,7 +2009,7 @@
           <a:p>
             <a:fld id="{1962816C-FB9E-9847-8BA2-FF6C50A8E851}" type="datetimeFigureOut">
               <a:rPr lang="en-US" smtClean="0"/>
-              <a:t>2/5/23</a:t>
+              <a:t>2/11/23</a:t>
             </a:fld>
             <a:endParaRPr lang="en-US"/>
           </a:p>
@@ -2104,7 +2122,7 @@
           <a:p>
             <a:fld id="{1962816C-FB9E-9847-8BA2-FF6C50A8E851}" type="datetimeFigureOut">
               <a:rPr lang="en-US" smtClean="0"/>
-              <a:t>2/5/23</a:t>
+              <a:t>2/11/23</a:t>
             </a:fld>
             <a:endParaRPr lang="en-US"/>
           </a:p>
@@ -2415,7 +2433,7 @@
           <a:p>
             <a:fld id="{1962816C-FB9E-9847-8BA2-FF6C50A8E851}" type="datetimeFigureOut">
               <a:rPr lang="en-US" smtClean="0"/>
-              <a:t>2/5/23</a:t>
+              <a:t>2/11/23</a:t>
             </a:fld>
             <a:endParaRPr lang="en-US"/>
           </a:p>
@@ -2703,7 +2721,7 @@
           <a:p>
             <a:fld id="{1962816C-FB9E-9847-8BA2-FF6C50A8E851}" type="datetimeFigureOut">
               <a:rPr lang="en-US" smtClean="0"/>
-              <a:t>2/5/23</a:t>
+              <a:t>2/11/23</a:t>
             </a:fld>
             <a:endParaRPr lang="en-US"/>
           </a:p>
@@ -2944,7 +2962,7 @@
           <a:p>
             <a:fld id="{1962816C-FB9E-9847-8BA2-FF6C50A8E851}" type="datetimeFigureOut">
               <a:rPr lang="en-US" smtClean="0"/>
-              <a:t>2/5/23</a:t>
+              <a:t>2/11/23</a:t>
             </a:fld>
             <a:endParaRPr lang="en-US"/>
           </a:p>
@@ -7044,6 +7062,3589 @@
   <p:clrMapOvr>
     <a:masterClrMapping/>
   </p:clrMapOvr>
+  <mc:AlternateContent xmlns:mc="http://schemas.openxmlformats.org/markup-compatibility/2006" xmlns:p159="http://schemas.microsoft.com/office/powerpoint/2015/09/main">
+    <mc:Choice Requires="p159">
+      <p:transition xmlns:p14="http://schemas.microsoft.com/office/powerpoint/2010/main" spd="slow" p14:dur="2000">
+        <p159:morph option="byObject"/>
+      </p:transition>
+    </mc:Choice>
+    <mc:Fallback xmlns="">
+      <p:transition spd="slow">
+        <p:fade/>
+      </p:transition>
+    </mc:Fallback>
+  </mc:AlternateContent>
+</p:sld>
+</file>
+
+<file path=ppt/slides/slide11.xml><?xml version="1.0" encoding="utf-8"?>
+<p:sld xmlns:a="http://schemas.openxmlformats.org/drawingml/2006/main" xmlns:r="http://schemas.openxmlformats.org/officeDocument/2006/relationships" xmlns:p="http://schemas.openxmlformats.org/presentationml/2006/main">
+  <p:cSld>
+    <p:spTree>
+      <p:nvGrpSpPr>
+        <p:cNvPr id="1" name=""/>
+        <p:cNvGrpSpPr/>
+        <p:nvPr/>
+      </p:nvGrpSpPr>
+      <p:grpSpPr>
+        <a:xfrm>
+          <a:off x="0" y="0"/>
+          <a:ext cx="0" cy="0"/>
+          <a:chOff x="0" y="0"/>
+          <a:chExt cx="0" cy="0"/>
+        </a:xfrm>
+      </p:grpSpPr>
+      <p:sp>
+        <p:nvSpPr>
+          <p:cNvPr id="2" name="Title 1">
+            <a:extLst>
+              <a:ext uri="{FF2B5EF4-FFF2-40B4-BE49-F238E27FC236}">
+                <a16:creationId xmlns:a16="http://schemas.microsoft.com/office/drawing/2014/main" id="{B99F70C7-48AD-704D-989E-CAEE02DF591A}"/>
+              </a:ext>
+            </a:extLst>
+          </p:cNvPr>
+          <p:cNvSpPr>
+            <a:spLocks noGrp="1"/>
+          </p:cNvSpPr>
+          <p:nvPr>
+            <p:ph type="ctrTitle"/>
+          </p:nvPr>
+        </p:nvSpPr>
+        <p:spPr>
+          <a:xfrm>
+            <a:off x="1524000" y="2928660"/>
+            <a:ext cx="9144000" cy="1000679"/>
+          </a:xfrm>
+        </p:spPr>
+        <p:txBody>
+          <a:bodyPr/>
+          <a:lstStyle/>
+          <a:p>
+            <a:r>
+              <a:rPr lang="en-US" dirty="0">
+                <a:latin typeface="Helvetica Neue" panose="02000503000000020004" pitchFamily="2" charset="0"/>
+                <a:ea typeface="Helvetica Neue" panose="02000503000000020004" pitchFamily="2" charset="0"/>
+                <a:cs typeface="Helvetica Neue" panose="02000503000000020004" pitchFamily="2" charset="0"/>
+              </a:rPr>
+              <a:t>Logic Behind Code</a:t>
+            </a:r>
+          </a:p>
+        </p:txBody>
+      </p:sp>
+    </p:spTree>
+    <p:extLst>
+      <p:ext uri="{BB962C8B-B14F-4D97-AF65-F5344CB8AC3E}">
+        <p14:creationId xmlns:p14="http://schemas.microsoft.com/office/powerpoint/2010/main" val="293523476"/>
+      </p:ext>
+    </p:extLst>
+  </p:cSld>
+  <p:clrMapOvr>
+    <a:masterClrMapping/>
+  </p:clrMapOvr>
+</p:sld>
+</file>
+
+<file path=ppt/slides/slide12.xml><?xml version="1.0" encoding="utf-8"?>
+<p:sld xmlns:a="http://schemas.openxmlformats.org/drawingml/2006/main" xmlns:r="http://schemas.openxmlformats.org/officeDocument/2006/relationships" xmlns:p="http://schemas.openxmlformats.org/presentationml/2006/main">
+  <p:cSld>
+    <p:spTree>
+      <p:nvGrpSpPr>
+        <p:cNvPr id="1" name=""/>
+        <p:cNvGrpSpPr/>
+        <p:nvPr/>
+      </p:nvGrpSpPr>
+      <p:grpSpPr>
+        <a:xfrm>
+          <a:off x="0" y="0"/>
+          <a:ext cx="0" cy="0"/>
+          <a:chOff x="0" y="0"/>
+          <a:chExt cx="0" cy="0"/>
+        </a:xfrm>
+      </p:grpSpPr>
+      <p:sp>
+        <p:nvSpPr>
+          <p:cNvPr id="2" name="Rectangle 1">
+            <a:extLst>
+              <a:ext uri="{FF2B5EF4-FFF2-40B4-BE49-F238E27FC236}">
+                <a16:creationId xmlns:a16="http://schemas.microsoft.com/office/drawing/2014/main" id="{C187AEBA-957E-BF46-8078-38ABFF1D9603}"/>
+              </a:ext>
+            </a:extLst>
+          </p:cNvPr>
+          <p:cNvSpPr/>
+          <p:nvPr/>
+        </p:nvSpPr>
+        <p:spPr>
+          <a:xfrm>
+            <a:off x="1345018" y="2183661"/>
+            <a:ext cx="2604977" cy="2490677"/>
+          </a:xfrm>
+          <a:prstGeom prst="rect">
+            <a:avLst/>
+          </a:prstGeom>
+          <a:solidFill>
+            <a:schemeClr val="bg2"/>
+          </a:solidFill>
+          <a:ln>
+            <a:noFill/>
+          </a:ln>
+        </p:spPr>
+        <p:style>
+          <a:lnRef idx="2">
+            <a:schemeClr val="accent1">
+              <a:shade val="50000"/>
+            </a:schemeClr>
+          </a:lnRef>
+          <a:fillRef idx="1">
+            <a:schemeClr val="accent1"/>
+          </a:fillRef>
+          <a:effectRef idx="0">
+            <a:schemeClr val="accent1"/>
+          </a:effectRef>
+          <a:fontRef idx="minor">
+            <a:schemeClr val="lt1"/>
+          </a:fontRef>
+        </p:style>
+        <p:txBody>
+          <a:bodyPr rtlCol="0" anchor="ctr"/>
+          <a:lstStyle/>
+          <a:p>
+            <a:pPr algn="ctr"/>
+            <a:r>
+              <a:rPr lang="en-US" dirty="0">
+                <a:ln w="0"/>
+                <a:solidFill>
+                  <a:schemeClr val="tx1"/>
+                </a:solidFill>
+                <a:effectLst>
+                  <a:outerShdw blurRad="38100" dist="19050" dir="2700000" algn="tl" rotWithShape="0">
+                    <a:schemeClr val="dk1">
+                      <a:alpha val="40000"/>
+                    </a:schemeClr>
+                  </a:outerShdw>
+                </a:effectLst>
+                <a:latin typeface="Helvetica Neue" panose="02000503000000020004" pitchFamily="2" charset="0"/>
+                <a:ea typeface="Helvetica Neue" panose="02000503000000020004" pitchFamily="2" charset="0"/>
+                <a:cs typeface="Helvetica Neue" panose="02000503000000020004" pitchFamily="2" charset="0"/>
+              </a:rPr>
+              <a:t>The project</a:t>
+            </a:r>
+          </a:p>
+        </p:txBody>
+      </p:sp>
+      <p:sp>
+        <p:nvSpPr>
+          <p:cNvPr id="3" name="Rectangle 2">
+            <a:extLst>
+              <a:ext uri="{FF2B5EF4-FFF2-40B4-BE49-F238E27FC236}">
+                <a16:creationId xmlns:a16="http://schemas.microsoft.com/office/drawing/2014/main" id="{5FD2B055-1CF7-C944-91EA-71A5DE661763}"/>
+              </a:ext>
+            </a:extLst>
+          </p:cNvPr>
+          <p:cNvSpPr/>
+          <p:nvPr/>
+        </p:nvSpPr>
+        <p:spPr>
+          <a:xfrm>
+            <a:off x="8242007" y="2183661"/>
+            <a:ext cx="2604977" cy="2490677"/>
+          </a:xfrm>
+          <a:prstGeom prst="rect">
+            <a:avLst/>
+          </a:prstGeom>
+          <a:solidFill>
+            <a:schemeClr val="bg2"/>
+          </a:solidFill>
+          <a:ln>
+            <a:noFill/>
+          </a:ln>
+        </p:spPr>
+        <p:style>
+          <a:lnRef idx="2">
+            <a:schemeClr val="accent1">
+              <a:shade val="50000"/>
+            </a:schemeClr>
+          </a:lnRef>
+          <a:fillRef idx="1">
+            <a:schemeClr val="accent1"/>
+          </a:fillRef>
+          <a:effectRef idx="0">
+            <a:schemeClr val="accent1"/>
+          </a:effectRef>
+          <a:fontRef idx="minor">
+            <a:schemeClr val="lt1"/>
+          </a:fontRef>
+        </p:style>
+        <p:txBody>
+          <a:bodyPr rtlCol="0" anchor="ctr"/>
+          <a:lstStyle/>
+          <a:p>
+            <a:pPr algn="ctr"/>
+            <a:r>
+              <a:rPr lang="en-US" dirty="0">
+                <a:solidFill>
+                  <a:schemeClr val="tx1"/>
+                </a:solidFill>
+                <a:latin typeface="Helvetica Neue" panose="02000503000000020004" pitchFamily="2" charset="0"/>
+                <a:ea typeface="Helvetica Neue" panose="02000503000000020004" pitchFamily="2" charset="0"/>
+                <a:cs typeface="Helvetica Neue" panose="02000503000000020004" pitchFamily="2" charset="0"/>
+              </a:rPr>
+              <a:t>Full Documentation</a:t>
+            </a:r>
+          </a:p>
+        </p:txBody>
+      </p:sp>
+      <p:cxnSp>
+        <p:nvCxnSpPr>
+          <p:cNvPr id="5" name="Straight Arrow Connector 4">
+            <a:extLst>
+              <a:ext uri="{FF2B5EF4-FFF2-40B4-BE49-F238E27FC236}">
+                <a16:creationId xmlns:a16="http://schemas.microsoft.com/office/drawing/2014/main" id="{A665726E-500A-7B45-8378-F42CC6F7B5F9}"/>
+              </a:ext>
+            </a:extLst>
+          </p:cNvPr>
+          <p:cNvCxnSpPr>
+            <a:stCxn id="2" idx="3"/>
+            <a:endCxn id="3" idx="1"/>
+          </p:cNvCxnSpPr>
+          <p:nvPr/>
+        </p:nvCxnSpPr>
+        <p:spPr>
+          <a:xfrm>
+            <a:off x="3949995" y="3429000"/>
+            <a:ext cx="4292012" cy="0"/>
+          </a:xfrm>
+          <a:prstGeom prst="straightConnector1">
+            <a:avLst/>
+          </a:prstGeom>
+          <a:ln>
+            <a:tailEnd type="triangle"/>
+          </a:ln>
+        </p:spPr>
+        <p:style>
+          <a:lnRef idx="1">
+            <a:schemeClr val="dk1"/>
+          </a:lnRef>
+          <a:fillRef idx="0">
+            <a:schemeClr val="dk1"/>
+          </a:fillRef>
+          <a:effectRef idx="0">
+            <a:schemeClr val="dk1"/>
+          </a:effectRef>
+          <a:fontRef idx="minor">
+            <a:schemeClr val="tx1"/>
+          </a:fontRef>
+        </p:style>
+      </p:cxnSp>
+    </p:spTree>
+    <p:extLst>
+      <p:ext uri="{BB962C8B-B14F-4D97-AF65-F5344CB8AC3E}">
+        <p14:creationId xmlns:p14="http://schemas.microsoft.com/office/powerpoint/2010/main" val="2057646939"/>
+      </p:ext>
+    </p:extLst>
+  </p:cSld>
+  <p:clrMapOvr>
+    <a:masterClrMapping/>
+  </p:clrMapOvr>
+</p:sld>
+</file>
+
+<file path=ppt/slides/slide13.xml><?xml version="1.0" encoding="utf-8"?>
+<p:sld xmlns:a="http://schemas.openxmlformats.org/drawingml/2006/main" xmlns:r="http://schemas.openxmlformats.org/officeDocument/2006/relationships" xmlns:p="http://schemas.openxmlformats.org/presentationml/2006/main">
+  <p:cSld>
+    <p:spTree>
+      <p:nvGrpSpPr>
+        <p:cNvPr id="1" name=""/>
+        <p:cNvGrpSpPr/>
+        <p:nvPr/>
+      </p:nvGrpSpPr>
+      <p:grpSpPr>
+        <a:xfrm>
+          <a:off x="0" y="0"/>
+          <a:ext cx="0" cy="0"/>
+          <a:chOff x="0" y="0"/>
+          <a:chExt cx="0" cy="0"/>
+        </a:xfrm>
+      </p:grpSpPr>
+      <p:sp>
+        <p:nvSpPr>
+          <p:cNvPr id="2" name="Rectangle 1">
+            <a:extLst>
+              <a:ext uri="{FF2B5EF4-FFF2-40B4-BE49-F238E27FC236}">
+                <a16:creationId xmlns:a16="http://schemas.microsoft.com/office/drawing/2014/main" id="{C187AEBA-957E-BF46-8078-38ABFF1D9603}"/>
+              </a:ext>
+            </a:extLst>
+          </p:cNvPr>
+          <p:cNvSpPr/>
+          <p:nvPr/>
+        </p:nvSpPr>
+        <p:spPr>
+          <a:xfrm>
+            <a:off x="1345015" y="2183660"/>
+            <a:ext cx="2604977" cy="2490677"/>
+          </a:xfrm>
+          <a:prstGeom prst="rect">
+            <a:avLst/>
+          </a:prstGeom>
+          <a:solidFill>
+            <a:schemeClr val="bg2"/>
+          </a:solidFill>
+          <a:ln>
+            <a:noFill/>
+          </a:ln>
+        </p:spPr>
+        <p:style>
+          <a:lnRef idx="2">
+            <a:schemeClr val="accent1">
+              <a:shade val="50000"/>
+            </a:schemeClr>
+          </a:lnRef>
+          <a:fillRef idx="1">
+            <a:schemeClr val="accent1"/>
+          </a:fillRef>
+          <a:effectRef idx="0">
+            <a:schemeClr val="accent1"/>
+          </a:effectRef>
+          <a:fontRef idx="minor">
+            <a:schemeClr val="lt1"/>
+          </a:fontRef>
+        </p:style>
+        <p:txBody>
+          <a:bodyPr rtlCol="0" anchor="ctr"/>
+          <a:lstStyle/>
+          <a:p>
+            <a:pPr algn="ctr"/>
+            <a:r>
+              <a:rPr lang="en-US" dirty="0">
+                <a:ln w="0"/>
+                <a:solidFill>
+                  <a:schemeClr val="tx1"/>
+                </a:solidFill>
+                <a:effectLst>
+                  <a:outerShdw blurRad="38100" dist="19050" dir="2700000" algn="tl" rotWithShape="0">
+                    <a:schemeClr val="dk1">
+                      <a:alpha val="40000"/>
+                    </a:schemeClr>
+                  </a:outerShdw>
+                </a:effectLst>
+                <a:latin typeface="Helvetica Neue" panose="02000503000000020004" pitchFamily="2" charset="0"/>
+                <a:ea typeface="Helvetica Neue" panose="02000503000000020004" pitchFamily="2" charset="0"/>
+                <a:cs typeface="Helvetica Neue" panose="02000503000000020004" pitchFamily="2" charset="0"/>
+              </a:rPr>
+              <a:t>The project</a:t>
+            </a:r>
+          </a:p>
+        </p:txBody>
+      </p:sp>
+      <p:sp>
+        <p:nvSpPr>
+          <p:cNvPr id="3" name="Rectangle 2">
+            <a:extLst>
+              <a:ext uri="{FF2B5EF4-FFF2-40B4-BE49-F238E27FC236}">
+                <a16:creationId xmlns:a16="http://schemas.microsoft.com/office/drawing/2014/main" id="{5FD2B055-1CF7-C944-91EA-71A5DE661763}"/>
+              </a:ext>
+            </a:extLst>
+          </p:cNvPr>
+          <p:cNvSpPr/>
+          <p:nvPr/>
+        </p:nvSpPr>
+        <p:spPr>
+          <a:xfrm>
+            <a:off x="12192000" y="2183661"/>
+            <a:ext cx="2604977" cy="2490677"/>
+          </a:xfrm>
+          <a:prstGeom prst="rect">
+            <a:avLst/>
+          </a:prstGeom>
+          <a:solidFill>
+            <a:schemeClr val="bg2"/>
+          </a:solidFill>
+          <a:ln>
+            <a:noFill/>
+          </a:ln>
+        </p:spPr>
+        <p:style>
+          <a:lnRef idx="2">
+            <a:schemeClr val="accent1">
+              <a:shade val="50000"/>
+            </a:schemeClr>
+          </a:lnRef>
+          <a:fillRef idx="1">
+            <a:schemeClr val="accent1"/>
+          </a:fillRef>
+          <a:effectRef idx="0">
+            <a:schemeClr val="accent1"/>
+          </a:effectRef>
+          <a:fontRef idx="minor">
+            <a:schemeClr val="lt1"/>
+          </a:fontRef>
+        </p:style>
+        <p:txBody>
+          <a:bodyPr rtlCol="0" anchor="ctr"/>
+          <a:lstStyle/>
+          <a:p>
+            <a:pPr algn="ctr"/>
+            <a:r>
+              <a:rPr lang="en-US" dirty="0">
+                <a:solidFill>
+                  <a:schemeClr val="tx1"/>
+                </a:solidFill>
+                <a:latin typeface="Helvetica Neue" panose="02000503000000020004" pitchFamily="2" charset="0"/>
+                <a:ea typeface="Helvetica Neue" panose="02000503000000020004" pitchFamily="2" charset="0"/>
+                <a:cs typeface="Helvetica Neue" panose="02000503000000020004" pitchFamily="2" charset="0"/>
+              </a:rPr>
+              <a:t>Full Documentation</a:t>
+            </a:r>
+          </a:p>
+        </p:txBody>
+      </p:sp>
+      <p:cxnSp>
+        <p:nvCxnSpPr>
+          <p:cNvPr id="5" name="Straight Arrow Connector 4">
+            <a:extLst>
+              <a:ext uri="{FF2B5EF4-FFF2-40B4-BE49-F238E27FC236}">
+                <a16:creationId xmlns:a16="http://schemas.microsoft.com/office/drawing/2014/main" id="{A665726E-500A-7B45-8378-F42CC6F7B5F9}"/>
+              </a:ext>
+            </a:extLst>
+          </p:cNvPr>
+          <p:cNvCxnSpPr>
+            <a:cxnSpLocks/>
+            <a:stCxn id="2" idx="3"/>
+            <a:endCxn id="7" idx="1"/>
+          </p:cNvCxnSpPr>
+          <p:nvPr/>
+        </p:nvCxnSpPr>
+        <p:spPr>
+          <a:xfrm flipV="1">
+            <a:off x="3949992" y="2183661"/>
+            <a:ext cx="1516028" cy="1245338"/>
+          </a:xfrm>
+          <a:prstGeom prst="straightConnector1">
+            <a:avLst/>
+          </a:prstGeom>
+          <a:ln>
+            <a:tailEnd type="triangle"/>
+          </a:ln>
+        </p:spPr>
+        <p:style>
+          <a:lnRef idx="1">
+            <a:schemeClr val="dk1"/>
+          </a:lnRef>
+          <a:fillRef idx="0">
+            <a:schemeClr val="dk1"/>
+          </a:fillRef>
+          <a:effectRef idx="0">
+            <a:schemeClr val="dk1"/>
+          </a:effectRef>
+          <a:fontRef idx="minor">
+            <a:schemeClr val="tx1"/>
+          </a:fontRef>
+        </p:style>
+      </p:cxnSp>
+      <p:sp>
+        <p:nvSpPr>
+          <p:cNvPr id="7" name="Rectangle 6">
+            <a:extLst>
+              <a:ext uri="{FF2B5EF4-FFF2-40B4-BE49-F238E27FC236}">
+                <a16:creationId xmlns:a16="http://schemas.microsoft.com/office/drawing/2014/main" id="{ADA911B0-587E-5540-8E01-D42477217907}"/>
+              </a:ext>
+            </a:extLst>
+          </p:cNvPr>
+          <p:cNvSpPr/>
+          <p:nvPr/>
+        </p:nvSpPr>
+        <p:spPr>
+          <a:xfrm>
+            <a:off x="5466020" y="1560992"/>
+            <a:ext cx="2604977" cy="1245338"/>
+          </a:xfrm>
+          <a:prstGeom prst="rect">
+            <a:avLst/>
+          </a:prstGeom>
+          <a:solidFill>
+            <a:schemeClr val="bg2"/>
+          </a:solidFill>
+          <a:ln>
+            <a:noFill/>
+          </a:ln>
+        </p:spPr>
+        <p:style>
+          <a:lnRef idx="2">
+            <a:schemeClr val="accent1">
+              <a:shade val="50000"/>
+            </a:schemeClr>
+          </a:lnRef>
+          <a:fillRef idx="1">
+            <a:schemeClr val="accent1"/>
+          </a:fillRef>
+          <a:effectRef idx="0">
+            <a:schemeClr val="accent1"/>
+          </a:effectRef>
+          <a:fontRef idx="minor">
+            <a:schemeClr val="lt1"/>
+          </a:fontRef>
+        </p:style>
+        <p:txBody>
+          <a:bodyPr rtlCol="0" anchor="ctr"/>
+          <a:lstStyle/>
+          <a:p>
+            <a:pPr algn="ctr"/>
+            <a:r>
+              <a:rPr lang="en-US" dirty="0">
+                <a:ln w="0"/>
+                <a:solidFill>
+                  <a:schemeClr val="tx1"/>
+                </a:solidFill>
+                <a:effectLst>
+                  <a:outerShdw blurRad="38100" dist="19050" dir="2700000" algn="tl" rotWithShape="0">
+                    <a:schemeClr val="dk1">
+                      <a:alpha val="40000"/>
+                    </a:schemeClr>
+                  </a:outerShdw>
+                </a:effectLst>
+                <a:latin typeface="Helvetica Neue" panose="02000503000000020004" pitchFamily="2" charset="0"/>
+                <a:ea typeface="Helvetica Neue" panose="02000503000000020004" pitchFamily="2" charset="0"/>
+                <a:cs typeface="Helvetica Neue" panose="02000503000000020004" pitchFamily="2" charset="0"/>
+              </a:rPr>
+              <a:t>Project Folders</a:t>
+            </a:r>
+          </a:p>
+        </p:txBody>
+      </p:sp>
+      <p:sp>
+        <p:nvSpPr>
+          <p:cNvPr id="8" name="Rectangle 7">
+            <a:extLst>
+              <a:ext uri="{FF2B5EF4-FFF2-40B4-BE49-F238E27FC236}">
+                <a16:creationId xmlns:a16="http://schemas.microsoft.com/office/drawing/2014/main" id="{1FCC797A-41D1-9549-9C3E-309022AA6E1A}"/>
+              </a:ext>
+            </a:extLst>
+          </p:cNvPr>
+          <p:cNvSpPr/>
+          <p:nvPr/>
+        </p:nvSpPr>
+        <p:spPr>
+          <a:xfrm>
+            <a:off x="5466019" y="4051670"/>
+            <a:ext cx="2604977" cy="1245338"/>
+          </a:xfrm>
+          <a:prstGeom prst="rect">
+            <a:avLst/>
+          </a:prstGeom>
+          <a:solidFill>
+            <a:schemeClr val="bg2"/>
+          </a:solidFill>
+          <a:ln>
+            <a:noFill/>
+          </a:ln>
+        </p:spPr>
+        <p:style>
+          <a:lnRef idx="2">
+            <a:schemeClr val="accent1">
+              <a:shade val="50000"/>
+            </a:schemeClr>
+          </a:lnRef>
+          <a:fillRef idx="1">
+            <a:schemeClr val="accent1"/>
+          </a:fillRef>
+          <a:effectRef idx="0">
+            <a:schemeClr val="accent1"/>
+          </a:effectRef>
+          <a:fontRef idx="minor">
+            <a:schemeClr val="lt1"/>
+          </a:fontRef>
+        </p:style>
+        <p:txBody>
+          <a:bodyPr rtlCol="0" anchor="ctr"/>
+          <a:lstStyle/>
+          <a:p>
+            <a:pPr algn="ctr"/>
+            <a:r>
+              <a:rPr lang="en-US" dirty="0">
+                <a:ln w="0"/>
+                <a:solidFill>
+                  <a:schemeClr val="tx1"/>
+                </a:solidFill>
+                <a:effectLst>
+                  <a:outerShdw blurRad="38100" dist="19050" dir="2700000" algn="tl" rotWithShape="0">
+                    <a:schemeClr val="dk1">
+                      <a:alpha val="40000"/>
+                    </a:schemeClr>
+                  </a:outerShdw>
+                </a:effectLst>
+                <a:latin typeface="Helvetica Neue" panose="02000503000000020004" pitchFamily="2" charset="0"/>
+                <a:ea typeface="Helvetica Neue" panose="02000503000000020004" pitchFamily="2" charset="0"/>
+                <a:cs typeface="Helvetica Neue" panose="02000503000000020004" pitchFamily="2" charset="0"/>
+              </a:rPr>
+              <a:t>Project Files</a:t>
+            </a:r>
+          </a:p>
+        </p:txBody>
+      </p:sp>
+      <p:cxnSp>
+        <p:nvCxnSpPr>
+          <p:cNvPr id="11" name="Straight Arrow Connector 10">
+            <a:extLst>
+              <a:ext uri="{FF2B5EF4-FFF2-40B4-BE49-F238E27FC236}">
+                <a16:creationId xmlns:a16="http://schemas.microsoft.com/office/drawing/2014/main" id="{E87F76D8-384A-6247-A379-4DA47769865B}"/>
+              </a:ext>
+            </a:extLst>
+          </p:cNvPr>
+          <p:cNvCxnSpPr>
+            <a:cxnSpLocks/>
+            <a:stCxn id="2" idx="3"/>
+            <a:endCxn id="8" idx="1"/>
+          </p:cNvCxnSpPr>
+          <p:nvPr/>
+        </p:nvCxnSpPr>
+        <p:spPr>
+          <a:xfrm>
+            <a:off x="3949992" y="3428999"/>
+            <a:ext cx="1516027" cy="1245340"/>
+          </a:xfrm>
+          <a:prstGeom prst="straightConnector1">
+            <a:avLst/>
+          </a:prstGeom>
+          <a:ln>
+            <a:tailEnd type="triangle"/>
+          </a:ln>
+        </p:spPr>
+        <p:style>
+          <a:lnRef idx="1">
+            <a:schemeClr val="dk1"/>
+          </a:lnRef>
+          <a:fillRef idx="0">
+            <a:schemeClr val="dk1"/>
+          </a:fillRef>
+          <a:effectRef idx="0">
+            <a:schemeClr val="dk1"/>
+          </a:effectRef>
+          <a:fontRef idx="minor">
+            <a:schemeClr val="tx1"/>
+          </a:fontRef>
+        </p:style>
+      </p:cxnSp>
+      <p:sp>
+        <p:nvSpPr>
+          <p:cNvPr id="16" name="TextBox 15">
+            <a:extLst>
+              <a:ext uri="{FF2B5EF4-FFF2-40B4-BE49-F238E27FC236}">
+                <a16:creationId xmlns:a16="http://schemas.microsoft.com/office/drawing/2014/main" id="{5ECDAF78-55C4-2F49-9DB6-C84F8CE30A1B}"/>
+              </a:ext>
+            </a:extLst>
+          </p:cNvPr>
+          <p:cNvSpPr txBox="1"/>
+          <p:nvPr/>
+        </p:nvSpPr>
+        <p:spPr>
+          <a:xfrm>
+            <a:off x="1667539" y="315652"/>
+            <a:ext cx="8856921" cy="369332"/>
+          </a:xfrm>
+          <a:prstGeom prst="rect">
+            <a:avLst/>
+          </a:prstGeom>
+          <a:noFill/>
+        </p:spPr>
+        <p:txBody>
+          <a:bodyPr wrap="square" rtlCol="0">
+            <a:spAutoFit/>
+          </a:bodyPr>
+          <a:lstStyle/>
+          <a:p>
+            <a:r>
+              <a:rPr lang="en-US" dirty="0"/>
+              <a:t>NB: </a:t>
+            </a:r>
+            <a:r>
+              <a:rPr lang="en-US" dirty="0" err="1"/>
+              <a:t>Ici</a:t>
+            </a:r>
+            <a:r>
+              <a:rPr lang="en-US" dirty="0"/>
+              <a:t> on assume le </a:t>
+            </a:r>
+            <a:r>
+              <a:rPr lang="en-US" dirty="0" err="1"/>
+              <a:t>cas</a:t>
+            </a:r>
+            <a:r>
+              <a:rPr lang="en-US" dirty="0"/>
+              <a:t> </a:t>
+            </a:r>
+            <a:r>
+              <a:rPr lang="en-US" dirty="0" err="1"/>
+              <a:t>où</a:t>
+            </a:r>
+            <a:r>
+              <a:rPr lang="en-US" dirty="0"/>
+              <a:t> il y a des folders et des files. Il y aura </a:t>
+            </a:r>
+            <a:r>
+              <a:rPr lang="en-US" dirty="0" err="1"/>
+              <a:t>une</a:t>
+            </a:r>
+            <a:r>
+              <a:rPr lang="en-US" dirty="0"/>
+              <a:t> option pour </a:t>
+            </a:r>
+            <a:r>
+              <a:rPr lang="en-US" dirty="0" err="1"/>
+              <a:t>juste</a:t>
+            </a:r>
+            <a:r>
+              <a:rPr lang="en-US" dirty="0"/>
+              <a:t> un file</a:t>
+            </a:r>
+          </a:p>
+        </p:txBody>
+      </p:sp>
+    </p:spTree>
+    <p:extLst>
+      <p:ext uri="{BB962C8B-B14F-4D97-AF65-F5344CB8AC3E}">
+        <p14:creationId xmlns:p14="http://schemas.microsoft.com/office/powerpoint/2010/main" val="1295494192"/>
+      </p:ext>
+    </p:extLst>
+  </p:cSld>
+  <p:clrMapOvr>
+    <a:masterClrMapping/>
+  </p:clrMapOvr>
+  <mc:AlternateContent xmlns:mc="http://schemas.openxmlformats.org/markup-compatibility/2006">
+    <mc:Choice xmlns:p159="http://schemas.microsoft.com/office/powerpoint/2015/09/main" Requires="p159">
+      <p:transition xmlns:p14="http://schemas.microsoft.com/office/powerpoint/2010/main" spd="slow" p14:dur="2000">
+        <p159:morph option="byObject"/>
+      </p:transition>
+    </mc:Choice>
+    <mc:Fallback>
+      <p:transition spd="slow">
+        <p:fade/>
+      </p:transition>
+    </mc:Fallback>
+  </mc:AlternateContent>
+</p:sld>
+</file>
+
+<file path=ppt/slides/slide14.xml><?xml version="1.0" encoding="utf-8"?>
+<p:sld xmlns:a="http://schemas.openxmlformats.org/drawingml/2006/main" xmlns:r="http://schemas.openxmlformats.org/officeDocument/2006/relationships" xmlns:p="http://schemas.openxmlformats.org/presentationml/2006/main">
+  <p:cSld>
+    <p:spTree>
+      <p:nvGrpSpPr>
+        <p:cNvPr id="1" name=""/>
+        <p:cNvGrpSpPr/>
+        <p:nvPr/>
+      </p:nvGrpSpPr>
+      <p:grpSpPr>
+        <a:xfrm>
+          <a:off x="0" y="0"/>
+          <a:ext cx="0" cy="0"/>
+          <a:chOff x="0" y="0"/>
+          <a:chExt cx="0" cy="0"/>
+        </a:xfrm>
+      </p:grpSpPr>
+      <p:sp>
+        <p:nvSpPr>
+          <p:cNvPr id="2" name="Rectangle 1">
+            <a:extLst>
+              <a:ext uri="{FF2B5EF4-FFF2-40B4-BE49-F238E27FC236}">
+                <a16:creationId xmlns:a16="http://schemas.microsoft.com/office/drawing/2014/main" id="{C187AEBA-957E-BF46-8078-38ABFF1D9603}"/>
+              </a:ext>
+            </a:extLst>
+          </p:cNvPr>
+          <p:cNvSpPr/>
+          <p:nvPr/>
+        </p:nvSpPr>
+        <p:spPr>
+          <a:xfrm>
+            <a:off x="540927" y="2806329"/>
+            <a:ext cx="1604631" cy="1245339"/>
+          </a:xfrm>
+          <a:prstGeom prst="rect">
+            <a:avLst/>
+          </a:prstGeom>
+          <a:solidFill>
+            <a:schemeClr val="bg2"/>
+          </a:solidFill>
+          <a:ln>
+            <a:noFill/>
+          </a:ln>
+        </p:spPr>
+        <p:style>
+          <a:lnRef idx="2">
+            <a:schemeClr val="accent1">
+              <a:shade val="50000"/>
+            </a:schemeClr>
+          </a:lnRef>
+          <a:fillRef idx="1">
+            <a:schemeClr val="accent1"/>
+          </a:fillRef>
+          <a:effectRef idx="0">
+            <a:schemeClr val="accent1"/>
+          </a:effectRef>
+          <a:fontRef idx="minor">
+            <a:schemeClr val="lt1"/>
+          </a:fontRef>
+        </p:style>
+        <p:txBody>
+          <a:bodyPr rtlCol="0" anchor="ctr"/>
+          <a:lstStyle/>
+          <a:p>
+            <a:pPr algn="ctr"/>
+            <a:r>
+              <a:rPr lang="en-US" sz="1400" dirty="0">
+                <a:ln w="0"/>
+                <a:solidFill>
+                  <a:schemeClr val="tx1"/>
+                </a:solidFill>
+                <a:effectLst>
+                  <a:outerShdw blurRad="38100" dist="19050" dir="2700000" algn="tl" rotWithShape="0">
+                    <a:schemeClr val="dk1">
+                      <a:alpha val="40000"/>
+                    </a:schemeClr>
+                  </a:outerShdw>
+                </a:effectLst>
+                <a:latin typeface="Helvetica Neue" panose="02000503000000020004" pitchFamily="2" charset="0"/>
+                <a:ea typeface="Helvetica Neue" panose="02000503000000020004" pitchFamily="2" charset="0"/>
+                <a:cs typeface="Helvetica Neue" panose="02000503000000020004" pitchFamily="2" charset="0"/>
+              </a:rPr>
+              <a:t>The project</a:t>
+            </a:r>
+          </a:p>
+        </p:txBody>
+      </p:sp>
+      <p:sp>
+        <p:nvSpPr>
+          <p:cNvPr id="3" name="Rectangle 2">
+            <a:extLst>
+              <a:ext uri="{FF2B5EF4-FFF2-40B4-BE49-F238E27FC236}">
+                <a16:creationId xmlns:a16="http://schemas.microsoft.com/office/drawing/2014/main" id="{5FD2B055-1CF7-C944-91EA-71A5DE661763}"/>
+              </a:ext>
+            </a:extLst>
+          </p:cNvPr>
+          <p:cNvSpPr/>
+          <p:nvPr/>
+        </p:nvSpPr>
+        <p:spPr>
+          <a:xfrm>
+            <a:off x="12192000" y="2183661"/>
+            <a:ext cx="2604977" cy="2490677"/>
+          </a:xfrm>
+          <a:prstGeom prst="rect">
+            <a:avLst/>
+          </a:prstGeom>
+          <a:solidFill>
+            <a:schemeClr val="bg2"/>
+          </a:solidFill>
+          <a:ln>
+            <a:noFill/>
+          </a:ln>
+        </p:spPr>
+        <p:style>
+          <a:lnRef idx="2">
+            <a:schemeClr val="accent1">
+              <a:shade val="50000"/>
+            </a:schemeClr>
+          </a:lnRef>
+          <a:fillRef idx="1">
+            <a:schemeClr val="accent1"/>
+          </a:fillRef>
+          <a:effectRef idx="0">
+            <a:schemeClr val="accent1"/>
+          </a:effectRef>
+          <a:fontRef idx="minor">
+            <a:schemeClr val="lt1"/>
+          </a:fontRef>
+        </p:style>
+        <p:txBody>
+          <a:bodyPr rtlCol="0" anchor="ctr"/>
+          <a:lstStyle/>
+          <a:p>
+            <a:pPr algn="ctr"/>
+            <a:r>
+              <a:rPr lang="en-US" dirty="0">
+                <a:solidFill>
+                  <a:schemeClr val="tx1"/>
+                </a:solidFill>
+                <a:latin typeface="Helvetica Neue" panose="02000503000000020004" pitchFamily="2" charset="0"/>
+                <a:ea typeface="Helvetica Neue" panose="02000503000000020004" pitchFamily="2" charset="0"/>
+                <a:cs typeface="Helvetica Neue" panose="02000503000000020004" pitchFamily="2" charset="0"/>
+              </a:rPr>
+              <a:t>Full Documentation</a:t>
+            </a:r>
+          </a:p>
+        </p:txBody>
+      </p:sp>
+      <p:cxnSp>
+        <p:nvCxnSpPr>
+          <p:cNvPr id="5" name="Straight Arrow Connector 4">
+            <a:extLst>
+              <a:ext uri="{FF2B5EF4-FFF2-40B4-BE49-F238E27FC236}">
+                <a16:creationId xmlns:a16="http://schemas.microsoft.com/office/drawing/2014/main" id="{A665726E-500A-7B45-8378-F42CC6F7B5F9}"/>
+              </a:ext>
+            </a:extLst>
+          </p:cNvPr>
+          <p:cNvCxnSpPr>
+            <a:cxnSpLocks/>
+            <a:stCxn id="2" idx="3"/>
+            <a:endCxn id="7" idx="1"/>
+          </p:cNvCxnSpPr>
+          <p:nvPr/>
+        </p:nvCxnSpPr>
+        <p:spPr>
+          <a:xfrm flipV="1">
+            <a:off x="2145558" y="2580056"/>
+            <a:ext cx="1559002" cy="848943"/>
+          </a:xfrm>
+          <a:prstGeom prst="straightConnector1">
+            <a:avLst/>
+          </a:prstGeom>
+          <a:ln>
+            <a:tailEnd type="triangle"/>
+          </a:ln>
+        </p:spPr>
+        <p:style>
+          <a:lnRef idx="1">
+            <a:schemeClr val="dk1"/>
+          </a:lnRef>
+          <a:fillRef idx="0">
+            <a:schemeClr val="dk1"/>
+          </a:fillRef>
+          <a:effectRef idx="0">
+            <a:schemeClr val="dk1"/>
+          </a:effectRef>
+          <a:fontRef idx="minor">
+            <a:schemeClr val="tx1"/>
+          </a:fontRef>
+        </p:style>
+      </p:cxnSp>
+      <p:sp>
+        <p:nvSpPr>
+          <p:cNvPr id="7" name="Rectangle 6">
+            <a:extLst>
+              <a:ext uri="{FF2B5EF4-FFF2-40B4-BE49-F238E27FC236}">
+                <a16:creationId xmlns:a16="http://schemas.microsoft.com/office/drawing/2014/main" id="{ADA911B0-587E-5540-8E01-D42477217907}"/>
+              </a:ext>
+            </a:extLst>
+          </p:cNvPr>
+          <p:cNvSpPr/>
+          <p:nvPr/>
+        </p:nvSpPr>
+        <p:spPr>
+          <a:xfrm>
+            <a:off x="3704560" y="2268721"/>
+            <a:ext cx="1604631" cy="622669"/>
+          </a:xfrm>
+          <a:prstGeom prst="rect">
+            <a:avLst/>
+          </a:prstGeom>
+          <a:solidFill>
+            <a:schemeClr val="bg2"/>
+          </a:solidFill>
+          <a:ln>
+            <a:noFill/>
+          </a:ln>
+        </p:spPr>
+        <p:style>
+          <a:lnRef idx="2">
+            <a:schemeClr val="accent1">
+              <a:shade val="50000"/>
+            </a:schemeClr>
+          </a:lnRef>
+          <a:fillRef idx="1">
+            <a:schemeClr val="accent1"/>
+          </a:fillRef>
+          <a:effectRef idx="0">
+            <a:schemeClr val="accent1"/>
+          </a:effectRef>
+          <a:fontRef idx="minor">
+            <a:schemeClr val="lt1"/>
+          </a:fontRef>
+        </p:style>
+        <p:txBody>
+          <a:bodyPr rtlCol="0" anchor="ctr"/>
+          <a:lstStyle/>
+          <a:p>
+            <a:pPr algn="ctr"/>
+            <a:r>
+              <a:rPr lang="en-US" sz="1400" dirty="0">
+                <a:ln w="0"/>
+                <a:solidFill>
+                  <a:schemeClr val="tx1"/>
+                </a:solidFill>
+                <a:effectLst>
+                  <a:outerShdw blurRad="38100" dist="19050" dir="2700000" algn="tl" rotWithShape="0">
+                    <a:schemeClr val="dk1">
+                      <a:alpha val="40000"/>
+                    </a:schemeClr>
+                  </a:outerShdw>
+                </a:effectLst>
+                <a:latin typeface="Helvetica Neue" panose="02000503000000020004" pitchFamily="2" charset="0"/>
+                <a:ea typeface="Helvetica Neue" panose="02000503000000020004" pitchFamily="2" charset="0"/>
+                <a:cs typeface="Helvetica Neue" panose="02000503000000020004" pitchFamily="2" charset="0"/>
+              </a:rPr>
+              <a:t>Project Folders</a:t>
+            </a:r>
+          </a:p>
+        </p:txBody>
+      </p:sp>
+      <p:sp>
+        <p:nvSpPr>
+          <p:cNvPr id="8" name="Rectangle 7">
+            <a:extLst>
+              <a:ext uri="{FF2B5EF4-FFF2-40B4-BE49-F238E27FC236}">
+                <a16:creationId xmlns:a16="http://schemas.microsoft.com/office/drawing/2014/main" id="{1FCC797A-41D1-9549-9C3E-309022AA6E1A}"/>
+              </a:ext>
+            </a:extLst>
+          </p:cNvPr>
+          <p:cNvSpPr/>
+          <p:nvPr/>
+        </p:nvSpPr>
+        <p:spPr>
+          <a:xfrm>
+            <a:off x="3704560" y="3966610"/>
+            <a:ext cx="1604631" cy="622669"/>
+          </a:xfrm>
+          <a:prstGeom prst="rect">
+            <a:avLst/>
+          </a:prstGeom>
+          <a:solidFill>
+            <a:schemeClr val="bg2"/>
+          </a:solidFill>
+          <a:ln>
+            <a:noFill/>
+          </a:ln>
+        </p:spPr>
+        <p:style>
+          <a:lnRef idx="2">
+            <a:schemeClr val="accent1">
+              <a:shade val="50000"/>
+            </a:schemeClr>
+          </a:lnRef>
+          <a:fillRef idx="1">
+            <a:schemeClr val="accent1"/>
+          </a:fillRef>
+          <a:effectRef idx="0">
+            <a:schemeClr val="accent1"/>
+          </a:effectRef>
+          <a:fontRef idx="minor">
+            <a:schemeClr val="lt1"/>
+          </a:fontRef>
+        </p:style>
+        <p:txBody>
+          <a:bodyPr rtlCol="0" anchor="ctr"/>
+          <a:lstStyle/>
+          <a:p>
+            <a:pPr algn="ctr"/>
+            <a:r>
+              <a:rPr lang="en-US" sz="1400" dirty="0">
+                <a:ln w="0"/>
+                <a:solidFill>
+                  <a:schemeClr val="tx1"/>
+                </a:solidFill>
+                <a:effectLst>
+                  <a:outerShdw blurRad="38100" dist="19050" dir="2700000" algn="tl" rotWithShape="0">
+                    <a:schemeClr val="dk1">
+                      <a:alpha val="40000"/>
+                    </a:schemeClr>
+                  </a:outerShdw>
+                </a:effectLst>
+                <a:latin typeface="Helvetica Neue" panose="02000503000000020004" pitchFamily="2" charset="0"/>
+                <a:ea typeface="Helvetica Neue" panose="02000503000000020004" pitchFamily="2" charset="0"/>
+                <a:cs typeface="Helvetica Neue" panose="02000503000000020004" pitchFamily="2" charset="0"/>
+              </a:rPr>
+              <a:t>Project Files</a:t>
+            </a:r>
+          </a:p>
+        </p:txBody>
+      </p:sp>
+      <p:cxnSp>
+        <p:nvCxnSpPr>
+          <p:cNvPr id="11" name="Straight Arrow Connector 10">
+            <a:extLst>
+              <a:ext uri="{FF2B5EF4-FFF2-40B4-BE49-F238E27FC236}">
+                <a16:creationId xmlns:a16="http://schemas.microsoft.com/office/drawing/2014/main" id="{E87F76D8-384A-6247-A379-4DA47769865B}"/>
+              </a:ext>
+            </a:extLst>
+          </p:cNvPr>
+          <p:cNvCxnSpPr>
+            <a:cxnSpLocks/>
+            <a:stCxn id="2" idx="3"/>
+            <a:endCxn id="8" idx="1"/>
+          </p:cNvCxnSpPr>
+          <p:nvPr/>
+        </p:nvCxnSpPr>
+        <p:spPr>
+          <a:xfrm>
+            <a:off x="2145558" y="3428999"/>
+            <a:ext cx="1559002" cy="848946"/>
+          </a:xfrm>
+          <a:prstGeom prst="straightConnector1">
+            <a:avLst/>
+          </a:prstGeom>
+          <a:ln>
+            <a:tailEnd type="triangle"/>
+          </a:ln>
+        </p:spPr>
+        <p:style>
+          <a:lnRef idx="1">
+            <a:schemeClr val="dk1"/>
+          </a:lnRef>
+          <a:fillRef idx="0">
+            <a:schemeClr val="dk1"/>
+          </a:fillRef>
+          <a:effectRef idx="0">
+            <a:schemeClr val="dk1"/>
+          </a:effectRef>
+          <a:fontRef idx="minor">
+            <a:schemeClr val="tx1"/>
+          </a:fontRef>
+        </p:style>
+      </p:cxnSp>
+      <p:sp>
+        <p:nvSpPr>
+          <p:cNvPr id="12" name="Rectangle 11">
+            <a:extLst>
+              <a:ext uri="{FF2B5EF4-FFF2-40B4-BE49-F238E27FC236}">
+                <a16:creationId xmlns:a16="http://schemas.microsoft.com/office/drawing/2014/main" id="{69BE0B28-FD00-304D-8948-E11325A21494}"/>
+              </a:ext>
+            </a:extLst>
+          </p:cNvPr>
+          <p:cNvSpPr/>
+          <p:nvPr/>
+        </p:nvSpPr>
+        <p:spPr>
+          <a:xfrm>
+            <a:off x="5965305" y="2268721"/>
+            <a:ext cx="1604631" cy="622669"/>
+          </a:xfrm>
+          <a:prstGeom prst="rect">
+            <a:avLst/>
+          </a:prstGeom>
+          <a:solidFill>
+            <a:schemeClr val="bg2"/>
+          </a:solidFill>
+          <a:ln>
+            <a:noFill/>
+          </a:ln>
+        </p:spPr>
+        <p:style>
+          <a:lnRef idx="2">
+            <a:schemeClr val="accent1">
+              <a:shade val="50000"/>
+            </a:schemeClr>
+          </a:lnRef>
+          <a:fillRef idx="1">
+            <a:schemeClr val="accent1"/>
+          </a:fillRef>
+          <a:effectRef idx="0">
+            <a:schemeClr val="accent1"/>
+          </a:effectRef>
+          <a:fontRef idx="minor">
+            <a:schemeClr val="lt1"/>
+          </a:fontRef>
+        </p:style>
+        <p:txBody>
+          <a:bodyPr rtlCol="0" anchor="ctr"/>
+          <a:lstStyle/>
+          <a:p>
+            <a:pPr algn="ctr"/>
+            <a:r>
+              <a:rPr lang="en-US" sz="1400" dirty="0">
+                <a:ln w="0"/>
+                <a:solidFill>
+                  <a:schemeClr val="tx1"/>
+                </a:solidFill>
+                <a:effectLst>
+                  <a:outerShdw blurRad="38100" dist="19050" dir="2700000" algn="tl" rotWithShape="0">
+                    <a:schemeClr val="dk1">
+                      <a:alpha val="40000"/>
+                    </a:schemeClr>
+                  </a:outerShdw>
+                </a:effectLst>
+                <a:latin typeface="Helvetica Neue" panose="02000503000000020004" pitchFamily="2" charset="0"/>
+                <a:ea typeface="Helvetica Neue" panose="02000503000000020004" pitchFamily="2" charset="0"/>
+                <a:cs typeface="Helvetica Neue" panose="02000503000000020004" pitchFamily="2" charset="0"/>
+              </a:rPr>
+              <a:t>Extract </a:t>
+            </a:r>
+            <a:r>
+              <a:rPr lang="en-US" sz="1400" dirty="0" err="1">
+                <a:ln w="0"/>
+                <a:solidFill>
+                  <a:schemeClr val="tx1"/>
+                </a:solidFill>
+                <a:effectLst>
+                  <a:outerShdw blurRad="38100" dist="19050" dir="2700000" algn="tl" rotWithShape="0">
+                    <a:schemeClr val="dk1">
+                      <a:alpha val="40000"/>
+                    </a:schemeClr>
+                  </a:outerShdw>
+                </a:effectLst>
+                <a:latin typeface="Helvetica Neue" panose="02000503000000020004" pitchFamily="2" charset="0"/>
+                <a:ea typeface="Helvetica Neue" panose="02000503000000020004" pitchFamily="2" charset="0"/>
+                <a:cs typeface="Helvetica Neue" panose="02000503000000020004" pitchFamily="2" charset="0"/>
+              </a:rPr>
+              <a:t>MetaData</a:t>
+            </a:r>
+            <a:endParaRPr lang="en-US" sz="1400" dirty="0">
+              <a:ln w="0"/>
+              <a:solidFill>
+                <a:schemeClr val="tx1"/>
+              </a:solidFill>
+              <a:effectLst>
+                <a:outerShdw blurRad="38100" dist="19050" dir="2700000" algn="tl" rotWithShape="0">
+                  <a:schemeClr val="dk1">
+                    <a:alpha val="40000"/>
+                  </a:schemeClr>
+                </a:outerShdw>
+              </a:effectLst>
+              <a:latin typeface="Helvetica Neue" panose="02000503000000020004" pitchFamily="2" charset="0"/>
+              <a:ea typeface="Helvetica Neue" panose="02000503000000020004" pitchFamily="2" charset="0"/>
+              <a:cs typeface="Helvetica Neue" panose="02000503000000020004" pitchFamily="2" charset="0"/>
+            </a:endParaRPr>
+          </a:p>
+        </p:txBody>
+      </p:sp>
+      <p:sp>
+        <p:nvSpPr>
+          <p:cNvPr id="13" name="Rectangle 12">
+            <a:extLst>
+              <a:ext uri="{FF2B5EF4-FFF2-40B4-BE49-F238E27FC236}">
+                <a16:creationId xmlns:a16="http://schemas.microsoft.com/office/drawing/2014/main" id="{206DD1C1-BF54-144A-98F8-CD3B27C38CDF}"/>
+              </a:ext>
+            </a:extLst>
+          </p:cNvPr>
+          <p:cNvSpPr/>
+          <p:nvPr/>
+        </p:nvSpPr>
+        <p:spPr>
+          <a:xfrm>
+            <a:off x="8226051" y="2268721"/>
+            <a:ext cx="1604631" cy="622669"/>
+          </a:xfrm>
+          <a:prstGeom prst="rect">
+            <a:avLst/>
+          </a:prstGeom>
+          <a:solidFill>
+            <a:schemeClr val="bg2"/>
+          </a:solidFill>
+          <a:ln>
+            <a:noFill/>
+          </a:ln>
+        </p:spPr>
+        <p:style>
+          <a:lnRef idx="2">
+            <a:schemeClr val="accent1">
+              <a:shade val="50000"/>
+            </a:schemeClr>
+          </a:lnRef>
+          <a:fillRef idx="1">
+            <a:schemeClr val="accent1"/>
+          </a:fillRef>
+          <a:effectRef idx="0">
+            <a:schemeClr val="accent1"/>
+          </a:effectRef>
+          <a:fontRef idx="minor">
+            <a:schemeClr val="lt1"/>
+          </a:fontRef>
+        </p:style>
+        <p:txBody>
+          <a:bodyPr rtlCol="0" anchor="ctr"/>
+          <a:lstStyle/>
+          <a:p>
+            <a:pPr algn="ctr"/>
+            <a:r>
+              <a:rPr lang="en-US" sz="1400" dirty="0">
+                <a:ln w="0"/>
+                <a:solidFill>
+                  <a:schemeClr val="tx1"/>
+                </a:solidFill>
+                <a:effectLst>
+                  <a:outerShdw blurRad="38100" dist="19050" dir="2700000" algn="tl" rotWithShape="0">
+                    <a:schemeClr val="dk1">
+                      <a:alpha val="40000"/>
+                    </a:schemeClr>
+                  </a:outerShdw>
+                </a:effectLst>
+                <a:latin typeface="Helvetica Neue" panose="02000503000000020004" pitchFamily="2" charset="0"/>
+                <a:ea typeface="Helvetica Neue" panose="02000503000000020004" pitchFamily="2" charset="0"/>
+                <a:cs typeface="Helvetica Neue" panose="02000503000000020004" pitchFamily="2" charset="0"/>
+              </a:rPr>
+              <a:t>Convert to md</a:t>
+            </a:r>
+          </a:p>
+        </p:txBody>
+      </p:sp>
+      <p:sp>
+        <p:nvSpPr>
+          <p:cNvPr id="14" name="Rectangle 13">
+            <a:extLst>
+              <a:ext uri="{FF2B5EF4-FFF2-40B4-BE49-F238E27FC236}">
+                <a16:creationId xmlns:a16="http://schemas.microsoft.com/office/drawing/2014/main" id="{CC7D9D65-44E3-9846-8468-406A36934380}"/>
+              </a:ext>
+            </a:extLst>
+          </p:cNvPr>
+          <p:cNvSpPr/>
+          <p:nvPr/>
+        </p:nvSpPr>
+        <p:spPr>
+          <a:xfrm>
+            <a:off x="10486797" y="2268720"/>
+            <a:ext cx="1604631" cy="622669"/>
+          </a:xfrm>
+          <a:prstGeom prst="rect">
+            <a:avLst/>
+          </a:prstGeom>
+          <a:solidFill>
+            <a:schemeClr val="bg2"/>
+          </a:solidFill>
+          <a:ln>
+            <a:noFill/>
+          </a:ln>
+        </p:spPr>
+        <p:style>
+          <a:lnRef idx="2">
+            <a:schemeClr val="accent1">
+              <a:shade val="50000"/>
+            </a:schemeClr>
+          </a:lnRef>
+          <a:fillRef idx="1">
+            <a:schemeClr val="accent1"/>
+          </a:fillRef>
+          <a:effectRef idx="0">
+            <a:schemeClr val="accent1"/>
+          </a:effectRef>
+          <a:fontRef idx="minor">
+            <a:schemeClr val="lt1"/>
+          </a:fontRef>
+        </p:style>
+        <p:txBody>
+          <a:bodyPr rtlCol="0" anchor="ctr"/>
+          <a:lstStyle/>
+          <a:p>
+            <a:pPr algn="ctr"/>
+            <a:r>
+              <a:rPr lang="en-US" sz="1400" dirty="0">
+                <a:ln w="0"/>
+                <a:solidFill>
+                  <a:schemeClr val="tx1"/>
+                </a:solidFill>
+                <a:effectLst>
+                  <a:outerShdw blurRad="38100" dist="19050" dir="2700000" algn="tl" rotWithShape="0">
+                    <a:schemeClr val="dk1">
+                      <a:alpha val="40000"/>
+                    </a:schemeClr>
+                  </a:outerShdw>
+                </a:effectLst>
+                <a:latin typeface="Helvetica Neue" panose="02000503000000020004" pitchFamily="2" charset="0"/>
+                <a:ea typeface="Helvetica Neue" panose="02000503000000020004" pitchFamily="2" charset="0"/>
+                <a:cs typeface="Helvetica Neue" panose="02000503000000020004" pitchFamily="2" charset="0"/>
+              </a:rPr>
+              <a:t>Store md File in a folder</a:t>
+            </a:r>
+          </a:p>
+        </p:txBody>
+      </p:sp>
+      <p:sp>
+        <p:nvSpPr>
+          <p:cNvPr id="15" name="Rectangle 14">
+            <a:extLst>
+              <a:ext uri="{FF2B5EF4-FFF2-40B4-BE49-F238E27FC236}">
+                <a16:creationId xmlns:a16="http://schemas.microsoft.com/office/drawing/2014/main" id="{00C844AD-4704-CD4F-97D2-79DF1547BCC4}"/>
+              </a:ext>
+            </a:extLst>
+          </p:cNvPr>
+          <p:cNvSpPr/>
+          <p:nvPr/>
+        </p:nvSpPr>
+        <p:spPr>
+          <a:xfrm>
+            <a:off x="5966190" y="3966609"/>
+            <a:ext cx="1604631" cy="622669"/>
+          </a:xfrm>
+          <a:prstGeom prst="rect">
+            <a:avLst/>
+          </a:prstGeom>
+          <a:solidFill>
+            <a:schemeClr val="bg2"/>
+          </a:solidFill>
+          <a:ln>
+            <a:noFill/>
+          </a:ln>
+        </p:spPr>
+        <p:style>
+          <a:lnRef idx="2">
+            <a:schemeClr val="accent1">
+              <a:shade val="50000"/>
+            </a:schemeClr>
+          </a:lnRef>
+          <a:fillRef idx="1">
+            <a:schemeClr val="accent1"/>
+          </a:fillRef>
+          <a:effectRef idx="0">
+            <a:schemeClr val="accent1"/>
+          </a:effectRef>
+          <a:fontRef idx="minor">
+            <a:schemeClr val="lt1"/>
+          </a:fontRef>
+        </p:style>
+        <p:txBody>
+          <a:bodyPr rtlCol="0" anchor="ctr"/>
+          <a:lstStyle/>
+          <a:p>
+            <a:pPr algn="ctr"/>
+            <a:r>
+              <a:rPr lang="en-US" sz="1400" dirty="0">
+                <a:ln w="0"/>
+                <a:solidFill>
+                  <a:schemeClr val="tx1"/>
+                </a:solidFill>
+                <a:effectLst>
+                  <a:outerShdw blurRad="38100" dist="19050" dir="2700000" algn="tl" rotWithShape="0">
+                    <a:schemeClr val="dk1">
+                      <a:alpha val="40000"/>
+                    </a:schemeClr>
+                  </a:outerShdw>
+                </a:effectLst>
+                <a:latin typeface="Helvetica Neue" panose="02000503000000020004" pitchFamily="2" charset="0"/>
+                <a:ea typeface="Helvetica Neue" panose="02000503000000020004" pitchFamily="2" charset="0"/>
+                <a:cs typeface="Helvetica Neue" panose="02000503000000020004" pitchFamily="2" charset="0"/>
+              </a:rPr>
+              <a:t>Extract </a:t>
+            </a:r>
+            <a:r>
+              <a:rPr lang="en-US" sz="1400" dirty="0" err="1">
+                <a:ln w="0"/>
+                <a:solidFill>
+                  <a:schemeClr val="tx1"/>
+                </a:solidFill>
+                <a:effectLst>
+                  <a:outerShdw blurRad="38100" dist="19050" dir="2700000" algn="tl" rotWithShape="0">
+                    <a:schemeClr val="dk1">
+                      <a:alpha val="40000"/>
+                    </a:schemeClr>
+                  </a:outerShdw>
+                </a:effectLst>
+                <a:latin typeface="Helvetica Neue" panose="02000503000000020004" pitchFamily="2" charset="0"/>
+                <a:ea typeface="Helvetica Neue" panose="02000503000000020004" pitchFamily="2" charset="0"/>
+                <a:cs typeface="Helvetica Neue" panose="02000503000000020004" pitchFamily="2" charset="0"/>
+              </a:rPr>
+              <a:t>MetaData</a:t>
+            </a:r>
+            <a:endParaRPr lang="en-US" sz="1400" dirty="0">
+              <a:ln w="0"/>
+              <a:solidFill>
+                <a:schemeClr val="tx1"/>
+              </a:solidFill>
+              <a:effectLst>
+                <a:outerShdw blurRad="38100" dist="19050" dir="2700000" algn="tl" rotWithShape="0">
+                  <a:schemeClr val="dk1">
+                    <a:alpha val="40000"/>
+                  </a:schemeClr>
+                </a:outerShdw>
+              </a:effectLst>
+              <a:latin typeface="Helvetica Neue" panose="02000503000000020004" pitchFamily="2" charset="0"/>
+              <a:ea typeface="Helvetica Neue" panose="02000503000000020004" pitchFamily="2" charset="0"/>
+              <a:cs typeface="Helvetica Neue" panose="02000503000000020004" pitchFamily="2" charset="0"/>
+            </a:endParaRPr>
+          </a:p>
+        </p:txBody>
+      </p:sp>
+      <p:sp>
+        <p:nvSpPr>
+          <p:cNvPr id="16" name="Rectangle 15">
+            <a:extLst>
+              <a:ext uri="{FF2B5EF4-FFF2-40B4-BE49-F238E27FC236}">
+                <a16:creationId xmlns:a16="http://schemas.microsoft.com/office/drawing/2014/main" id="{6DC2404B-E54A-7647-81BA-BFB5734CA9D1}"/>
+              </a:ext>
+            </a:extLst>
+          </p:cNvPr>
+          <p:cNvSpPr/>
+          <p:nvPr/>
+        </p:nvSpPr>
+        <p:spPr>
+          <a:xfrm>
+            <a:off x="8226050" y="3966608"/>
+            <a:ext cx="1604631" cy="622669"/>
+          </a:xfrm>
+          <a:prstGeom prst="rect">
+            <a:avLst/>
+          </a:prstGeom>
+          <a:solidFill>
+            <a:schemeClr val="bg2"/>
+          </a:solidFill>
+          <a:ln>
+            <a:noFill/>
+          </a:ln>
+        </p:spPr>
+        <p:style>
+          <a:lnRef idx="2">
+            <a:schemeClr val="accent1">
+              <a:shade val="50000"/>
+            </a:schemeClr>
+          </a:lnRef>
+          <a:fillRef idx="1">
+            <a:schemeClr val="accent1"/>
+          </a:fillRef>
+          <a:effectRef idx="0">
+            <a:schemeClr val="accent1"/>
+          </a:effectRef>
+          <a:fontRef idx="minor">
+            <a:schemeClr val="lt1"/>
+          </a:fontRef>
+        </p:style>
+        <p:txBody>
+          <a:bodyPr rtlCol="0" anchor="ctr"/>
+          <a:lstStyle/>
+          <a:p>
+            <a:pPr algn="ctr"/>
+            <a:r>
+              <a:rPr lang="en-US" sz="1400" dirty="0">
+                <a:ln w="0"/>
+                <a:solidFill>
+                  <a:schemeClr val="tx1"/>
+                </a:solidFill>
+                <a:effectLst>
+                  <a:outerShdw blurRad="38100" dist="19050" dir="2700000" algn="tl" rotWithShape="0">
+                    <a:schemeClr val="dk1">
+                      <a:alpha val="40000"/>
+                    </a:schemeClr>
+                  </a:outerShdw>
+                </a:effectLst>
+                <a:latin typeface="Helvetica Neue" panose="02000503000000020004" pitchFamily="2" charset="0"/>
+                <a:ea typeface="Helvetica Neue" panose="02000503000000020004" pitchFamily="2" charset="0"/>
+                <a:cs typeface="Helvetica Neue" panose="02000503000000020004" pitchFamily="2" charset="0"/>
+              </a:rPr>
+              <a:t>Convert to md</a:t>
+            </a:r>
+          </a:p>
+        </p:txBody>
+      </p:sp>
+      <p:sp>
+        <p:nvSpPr>
+          <p:cNvPr id="18" name="Rectangle 17">
+            <a:extLst>
+              <a:ext uri="{FF2B5EF4-FFF2-40B4-BE49-F238E27FC236}">
+                <a16:creationId xmlns:a16="http://schemas.microsoft.com/office/drawing/2014/main" id="{523016A5-DA37-B94A-A909-3D1C017063BE}"/>
+              </a:ext>
+            </a:extLst>
+          </p:cNvPr>
+          <p:cNvSpPr/>
+          <p:nvPr/>
+        </p:nvSpPr>
+        <p:spPr>
+          <a:xfrm>
+            <a:off x="10486797" y="3966607"/>
+            <a:ext cx="1604631" cy="622669"/>
+          </a:xfrm>
+          <a:prstGeom prst="rect">
+            <a:avLst/>
+          </a:prstGeom>
+          <a:solidFill>
+            <a:schemeClr val="bg2"/>
+          </a:solidFill>
+          <a:ln>
+            <a:noFill/>
+          </a:ln>
+        </p:spPr>
+        <p:style>
+          <a:lnRef idx="2">
+            <a:schemeClr val="accent1">
+              <a:shade val="50000"/>
+            </a:schemeClr>
+          </a:lnRef>
+          <a:fillRef idx="1">
+            <a:schemeClr val="accent1"/>
+          </a:fillRef>
+          <a:effectRef idx="0">
+            <a:schemeClr val="accent1"/>
+          </a:effectRef>
+          <a:fontRef idx="minor">
+            <a:schemeClr val="lt1"/>
+          </a:fontRef>
+        </p:style>
+        <p:txBody>
+          <a:bodyPr rtlCol="0" anchor="ctr"/>
+          <a:lstStyle/>
+          <a:p>
+            <a:pPr algn="ctr"/>
+            <a:r>
+              <a:rPr lang="en-US" sz="1400" dirty="0">
+                <a:ln w="0"/>
+                <a:solidFill>
+                  <a:schemeClr val="tx1"/>
+                </a:solidFill>
+                <a:effectLst>
+                  <a:outerShdw blurRad="38100" dist="19050" dir="2700000" algn="tl" rotWithShape="0">
+                    <a:schemeClr val="dk1">
+                      <a:alpha val="40000"/>
+                    </a:schemeClr>
+                  </a:outerShdw>
+                </a:effectLst>
+                <a:latin typeface="Helvetica Neue" panose="02000503000000020004" pitchFamily="2" charset="0"/>
+                <a:ea typeface="Helvetica Neue" panose="02000503000000020004" pitchFamily="2" charset="0"/>
+                <a:cs typeface="Helvetica Neue" panose="02000503000000020004" pitchFamily="2" charset="0"/>
+              </a:rPr>
+              <a:t>Store md File in a folder</a:t>
+            </a:r>
+          </a:p>
+        </p:txBody>
+      </p:sp>
+      <p:cxnSp>
+        <p:nvCxnSpPr>
+          <p:cNvPr id="19" name="Straight Arrow Connector 18">
+            <a:extLst>
+              <a:ext uri="{FF2B5EF4-FFF2-40B4-BE49-F238E27FC236}">
+                <a16:creationId xmlns:a16="http://schemas.microsoft.com/office/drawing/2014/main" id="{F11AA343-4C54-8A4D-9C00-6C67C6A5097D}"/>
+              </a:ext>
+            </a:extLst>
+          </p:cNvPr>
+          <p:cNvCxnSpPr>
+            <a:cxnSpLocks/>
+            <a:stCxn id="7" idx="3"/>
+            <a:endCxn id="12" idx="1"/>
+          </p:cNvCxnSpPr>
+          <p:nvPr/>
+        </p:nvCxnSpPr>
+        <p:spPr>
+          <a:xfrm>
+            <a:off x="5309191" y="2580056"/>
+            <a:ext cx="656114" cy="0"/>
+          </a:xfrm>
+          <a:prstGeom prst="straightConnector1">
+            <a:avLst/>
+          </a:prstGeom>
+          <a:ln>
+            <a:tailEnd type="triangle"/>
+          </a:ln>
+        </p:spPr>
+        <p:style>
+          <a:lnRef idx="1">
+            <a:schemeClr val="dk1"/>
+          </a:lnRef>
+          <a:fillRef idx="0">
+            <a:schemeClr val="dk1"/>
+          </a:fillRef>
+          <a:effectRef idx="0">
+            <a:schemeClr val="dk1"/>
+          </a:effectRef>
+          <a:fontRef idx="minor">
+            <a:schemeClr val="tx1"/>
+          </a:fontRef>
+        </p:style>
+      </p:cxnSp>
+      <p:cxnSp>
+        <p:nvCxnSpPr>
+          <p:cNvPr id="22" name="Straight Arrow Connector 21">
+            <a:extLst>
+              <a:ext uri="{FF2B5EF4-FFF2-40B4-BE49-F238E27FC236}">
+                <a16:creationId xmlns:a16="http://schemas.microsoft.com/office/drawing/2014/main" id="{E35DD07D-4123-A146-98E9-5947E0489A44}"/>
+              </a:ext>
+            </a:extLst>
+          </p:cNvPr>
+          <p:cNvCxnSpPr>
+            <a:cxnSpLocks/>
+            <a:stCxn id="12" idx="3"/>
+            <a:endCxn id="13" idx="1"/>
+          </p:cNvCxnSpPr>
+          <p:nvPr/>
+        </p:nvCxnSpPr>
+        <p:spPr>
+          <a:xfrm>
+            <a:off x="7569936" y="2580056"/>
+            <a:ext cx="656115" cy="0"/>
+          </a:xfrm>
+          <a:prstGeom prst="straightConnector1">
+            <a:avLst/>
+          </a:prstGeom>
+          <a:ln>
+            <a:tailEnd type="triangle"/>
+          </a:ln>
+        </p:spPr>
+        <p:style>
+          <a:lnRef idx="1">
+            <a:schemeClr val="dk1"/>
+          </a:lnRef>
+          <a:fillRef idx="0">
+            <a:schemeClr val="dk1"/>
+          </a:fillRef>
+          <a:effectRef idx="0">
+            <a:schemeClr val="dk1"/>
+          </a:effectRef>
+          <a:fontRef idx="minor">
+            <a:schemeClr val="tx1"/>
+          </a:fontRef>
+        </p:style>
+      </p:cxnSp>
+      <p:cxnSp>
+        <p:nvCxnSpPr>
+          <p:cNvPr id="25" name="Straight Arrow Connector 24">
+            <a:extLst>
+              <a:ext uri="{FF2B5EF4-FFF2-40B4-BE49-F238E27FC236}">
+                <a16:creationId xmlns:a16="http://schemas.microsoft.com/office/drawing/2014/main" id="{CAE4C1B0-83D5-7B48-A800-22FA87DBB7CE}"/>
+              </a:ext>
+            </a:extLst>
+          </p:cNvPr>
+          <p:cNvCxnSpPr>
+            <a:cxnSpLocks/>
+            <a:stCxn id="13" idx="3"/>
+            <a:endCxn id="14" idx="1"/>
+          </p:cNvCxnSpPr>
+          <p:nvPr/>
+        </p:nvCxnSpPr>
+        <p:spPr>
+          <a:xfrm flipV="1">
+            <a:off x="9830682" y="2580055"/>
+            <a:ext cx="656115" cy="1"/>
+          </a:xfrm>
+          <a:prstGeom prst="straightConnector1">
+            <a:avLst/>
+          </a:prstGeom>
+          <a:ln>
+            <a:tailEnd type="triangle"/>
+          </a:ln>
+        </p:spPr>
+        <p:style>
+          <a:lnRef idx="1">
+            <a:schemeClr val="dk1"/>
+          </a:lnRef>
+          <a:fillRef idx="0">
+            <a:schemeClr val="dk1"/>
+          </a:fillRef>
+          <a:effectRef idx="0">
+            <a:schemeClr val="dk1"/>
+          </a:effectRef>
+          <a:fontRef idx="minor">
+            <a:schemeClr val="tx1"/>
+          </a:fontRef>
+        </p:style>
+      </p:cxnSp>
+      <p:cxnSp>
+        <p:nvCxnSpPr>
+          <p:cNvPr id="28" name="Straight Arrow Connector 27">
+            <a:extLst>
+              <a:ext uri="{FF2B5EF4-FFF2-40B4-BE49-F238E27FC236}">
+                <a16:creationId xmlns:a16="http://schemas.microsoft.com/office/drawing/2014/main" id="{614380BE-1314-D544-B111-EF23BEBA8958}"/>
+              </a:ext>
+            </a:extLst>
+          </p:cNvPr>
+          <p:cNvCxnSpPr>
+            <a:cxnSpLocks/>
+            <a:stCxn id="8" idx="3"/>
+            <a:endCxn id="15" idx="1"/>
+          </p:cNvCxnSpPr>
+          <p:nvPr/>
+        </p:nvCxnSpPr>
+        <p:spPr>
+          <a:xfrm flipV="1">
+            <a:off x="5309191" y="4277944"/>
+            <a:ext cx="656999" cy="1"/>
+          </a:xfrm>
+          <a:prstGeom prst="straightConnector1">
+            <a:avLst/>
+          </a:prstGeom>
+          <a:ln>
+            <a:tailEnd type="triangle"/>
+          </a:ln>
+        </p:spPr>
+        <p:style>
+          <a:lnRef idx="1">
+            <a:schemeClr val="dk1"/>
+          </a:lnRef>
+          <a:fillRef idx="0">
+            <a:schemeClr val="dk1"/>
+          </a:fillRef>
+          <a:effectRef idx="0">
+            <a:schemeClr val="dk1"/>
+          </a:effectRef>
+          <a:fontRef idx="minor">
+            <a:schemeClr val="tx1"/>
+          </a:fontRef>
+        </p:style>
+      </p:cxnSp>
+      <p:cxnSp>
+        <p:nvCxnSpPr>
+          <p:cNvPr id="31" name="Straight Arrow Connector 30">
+            <a:extLst>
+              <a:ext uri="{FF2B5EF4-FFF2-40B4-BE49-F238E27FC236}">
+                <a16:creationId xmlns:a16="http://schemas.microsoft.com/office/drawing/2014/main" id="{5D94DDD3-6C4B-F444-B864-D85F8612A231}"/>
+              </a:ext>
+            </a:extLst>
+          </p:cNvPr>
+          <p:cNvCxnSpPr>
+            <a:cxnSpLocks/>
+            <a:stCxn id="15" idx="3"/>
+            <a:endCxn id="16" idx="1"/>
+          </p:cNvCxnSpPr>
+          <p:nvPr/>
+        </p:nvCxnSpPr>
+        <p:spPr>
+          <a:xfrm flipV="1">
+            <a:off x="7570821" y="4277943"/>
+            <a:ext cx="655229" cy="1"/>
+          </a:xfrm>
+          <a:prstGeom prst="straightConnector1">
+            <a:avLst/>
+          </a:prstGeom>
+          <a:ln>
+            <a:tailEnd type="triangle"/>
+          </a:ln>
+        </p:spPr>
+        <p:style>
+          <a:lnRef idx="1">
+            <a:schemeClr val="dk1"/>
+          </a:lnRef>
+          <a:fillRef idx="0">
+            <a:schemeClr val="dk1"/>
+          </a:fillRef>
+          <a:effectRef idx="0">
+            <a:schemeClr val="dk1"/>
+          </a:effectRef>
+          <a:fontRef idx="minor">
+            <a:schemeClr val="tx1"/>
+          </a:fontRef>
+        </p:style>
+      </p:cxnSp>
+      <p:cxnSp>
+        <p:nvCxnSpPr>
+          <p:cNvPr id="34" name="Straight Arrow Connector 33">
+            <a:extLst>
+              <a:ext uri="{FF2B5EF4-FFF2-40B4-BE49-F238E27FC236}">
+                <a16:creationId xmlns:a16="http://schemas.microsoft.com/office/drawing/2014/main" id="{32123974-64ED-254A-B509-5ED227C1C664}"/>
+              </a:ext>
+            </a:extLst>
+          </p:cNvPr>
+          <p:cNvCxnSpPr>
+            <a:cxnSpLocks/>
+            <a:stCxn id="16" idx="3"/>
+            <a:endCxn id="18" idx="1"/>
+          </p:cNvCxnSpPr>
+          <p:nvPr/>
+        </p:nvCxnSpPr>
+        <p:spPr>
+          <a:xfrm flipV="1">
+            <a:off x="9830681" y="4277942"/>
+            <a:ext cx="656116" cy="1"/>
+          </a:xfrm>
+          <a:prstGeom prst="straightConnector1">
+            <a:avLst/>
+          </a:prstGeom>
+          <a:ln>
+            <a:tailEnd type="triangle"/>
+          </a:ln>
+        </p:spPr>
+        <p:style>
+          <a:lnRef idx="1">
+            <a:schemeClr val="dk1"/>
+          </a:lnRef>
+          <a:fillRef idx="0">
+            <a:schemeClr val="dk1"/>
+          </a:fillRef>
+          <a:effectRef idx="0">
+            <a:schemeClr val="dk1"/>
+          </a:effectRef>
+          <a:fontRef idx="minor">
+            <a:schemeClr val="tx1"/>
+          </a:fontRef>
+        </p:style>
+      </p:cxnSp>
+    </p:spTree>
+    <p:extLst>
+      <p:ext uri="{BB962C8B-B14F-4D97-AF65-F5344CB8AC3E}">
+        <p14:creationId xmlns:p14="http://schemas.microsoft.com/office/powerpoint/2010/main" val="2542147110"/>
+      </p:ext>
+    </p:extLst>
+  </p:cSld>
+  <p:clrMapOvr>
+    <a:masterClrMapping/>
+  </p:clrMapOvr>
+  <mc:AlternateContent xmlns:mc="http://schemas.openxmlformats.org/markup-compatibility/2006">
+    <mc:Choice xmlns:p159="http://schemas.microsoft.com/office/powerpoint/2015/09/main" Requires="p159">
+      <p:transition xmlns:p14="http://schemas.microsoft.com/office/powerpoint/2010/main" spd="slow" p14:dur="2000">
+        <p159:morph option="byObject"/>
+      </p:transition>
+    </mc:Choice>
+    <mc:Fallback>
+      <p:transition spd="slow">
+        <p:fade/>
+      </p:transition>
+    </mc:Fallback>
+  </mc:AlternateContent>
+</p:sld>
+</file>
+
+<file path=ppt/slides/slide15.xml><?xml version="1.0" encoding="utf-8"?>
+<p:sld xmlns:a="http://schemas.openxmlformats.org/drawingml/2006/main" xmlns:r="http://schemas.openxmlformats.org/officeDocument/2006/relationships" xmlns:p="http://schemas.openxmlformats.org/presentationml/2006/main">
+  <p:cSld>
+    <p:spTree>
+      <p:nvGrpSpPr>
+        <p:cNvPr id="1" name=""/>
+        <p:cNvGrpSpPr/>
+        <p:nvPr/>
+      </p:nvGrpSpPr>
+      <p:grpSpPr>
+        <a:xfrm>
+          <a:off x="0" y="0"/>
+          <a:ext cx="0" cy="0"/>
+          <a:chOff x="0" y="0"/>
+          <a:chExt cx="0" cy="0"/>
+        </a:xfrm>
+      </p:grpSpPr>
+      <p:sp>
+        <p:nvSpPr>
+          <p:cNvPr id="2" name="Rectangle 1">
+            <a:extLst>
+              <a:ext uri="{FF2B5EF4-FFF2-40B4-BE49-F238E27FC236}">
+                <a16:creationId xmlns:a16="http://schemas.microsoft.com/office/drawing/2014/main" id="{C187AEBA-957E-BF46-8078-38ABFF1D9603}"/>
+              </a:ext>
+            </a:extLst>
+          </p:cNvPr>
+          <p:cNvSpPr/>
+          <p:nvPr/>
+        </p:nvSpPr>
+        <p:spPr>
+          <a:xfrm>
+            <a:off x="540927" y="2806329"/>
+            <a:ext cx="1604631" cy="1245339"/>
+          </a:xfrm>
+          <a:prstGeom prst="rect">
+            <a:avLst/>
+          </a:prstGeom>
+          <a:solidFill>
+            <a:schemeClr val="bg2"/>
+          </a:solidFill>
+          <a:ln>
+            <a:noFill/>
+          </a:ln>
+        </p:spPr>
+        <p:style>
+          <a:lnRef idx="2">
+            <a:schemeClr val="accent1">
+              <a:shade val="50000"/>
+            </a:schemeClr>
+          </a:lnRef>
+          <a:fillRef idx="1">
+            <a:schemeClr val="accent1"/>
+          </a:fillRef>
+          <a:effectRef idx="0">
+            <a:schemeClr val="accent1"/>
+          </a:effectRef>
+          <a:fontRef idx="minor">
+            <a:schemeClr val="lt1"/>
+          </a:fontRef>
+        </p:style>
+        <p:txBody>
+          <a:bodyPr rtlCol="0" anchor="ctr"/>
+          <a:lstStyle/>
+          <a:p>
+            <a:pPr algn="ctr"/>
+            <a:r>
+              <a:rPr lang="en-US" sz="1400" dirty="0">
+                <a:ln w="0"/>
+                <a:solidFill>
+                  <a:schemeClr val="tx1"/>
+                </a:solidFill>
+                <a:effectLst>
+                  <a:outerShdw blurRad="38100" dist="19050" dir="2700000" algn="tl" rotWithShape="0">
+                    <a:schemeClr val="dk1">
+                      <a:alpha val="40000"/>
+                    </a:schemeClr>
+                  </a:outerShdw>
+                </a:effectLst>
+                <a:latin typeface="Helvetica Neue" panose="02000503000000020004" pitchFamily="2" charset="0"/>
+                <a:ea typeface="Helvetica Neue" panose="02000503000000020004" pitchFamily="2" charset="0"/>
+                <a:cs typeface="Helvetica Neue" panose="02000503000000020004" pitchFamily="2" charset="0"/>
+              </a:rPr>
+              <a:t>The project</a:t>
+            </a:r>
+          </a:p>
+        </p:txBody>
+      </p:sp>
+      <p:sp>
+        <p:nvSpPr>
+          <p:cNvPr id="3" name="Rectangle 2">
+            <a:extLst>
+              <a:ext uri="{FF2B5EF4-FFF2-40B4-BE49-F238E27FC236}">
+                <a16:creationId xmlns:a16="http://schemas.microsoft.com/office/drawing/2014/main" id="{5FD2B055-1CF7-C944-91EA-71A5DE661763}"/>
+              </a:ext>
+            </a:extLst>
+          </p:cNvPr>
+          <p:cNvSpPr/>
+          <p:nvPr/>
+        </p:nvSpPr>
+        <p:spPr>
+          <a:xfrm>
+            <a:off x="12192000" y="2183661"/>
+            <a:ext cx="2604977" cy="2490677"/>
+          </a:xfrm>
+          <a:prstGeom prst="rect">
+            <a:avLst/>
+          </a:prstGeom>
+          <a:solidFill>
+            <a:schemeClr val="bg2"/>
+          </a:solidFill>
+          <a:ln>
+            <a:noFill/>
+          </a:ln>
+        </p:spPr>
+        <p:style>
+          <a:lnRef idx="2">
+            <a:schemeClr val="accent1">
+              <a:shade val="50000"/>
+            </a:schemeClr>
+          </a:lnRef>
+          <a:fillRef idx="1">
+            <a:schemeClr val="accent1"/>
+          </a:fillRef>
+          <a:effectRef idx="0">
+            <a:schemeClr val="accent1"/>
+          </a:effectRef>
+          <a:fontRef idx="minor">
+            <a:schemeClr val="lt1"/>
+          </a:fontRef>
+        </p:style>
+        <p:txBody>
+          <a:bodyPr rtlCol="0" anchor="ctr"/>
+          <a:lstStyle/>
+          <a:p>
+            <a:pPr algn="ctr"/>
+            <a:r>
+              <a:rPr lang="en-US" dirty="0">
+                <a:solidFill>
+                  <a:schemeClr val="tx1"/>
+                </a:solidFill>
+                <a:latin typeface="Helvetica Neue" panose="02000503000000020004" pitchFamily="2" charset="0"/>
+                <a:ea typeface="Helvetica Neue" panose="02000503000000020004" pitchFamily="2" charset="0"/>
+                <a:cs typeface="Helvetica Neue" panose="02000503000000020004" pitchFamily="2" charset="0"/>
+              </a:rPr>
+              <a:t>Full Documentation</a:t>
+            </a:r>
+          </a:p>
+        </p:txBody>
+      </p:sp>
+      <p:cxnSp>
+        <p:nvCxnSpPr>
+          <p:cNvPr id="5" name="Straight Arrow Connector 4">
+            <a:extLst>
+              <a:ext uri="{FF2B5EF4-FFF2-40B4-BE49-F238E27FC236}">
+                <a16:creationId xmlns:a16="http://schemas.microsoft.com/office/drawing/2014/main" id="{A665726E-500A-7B45-8378-F42CC6F7B5F9}"/>
+              </a:ext>
+            </a:extLst>
+          </p:cNvPr>
+          <p:cNvCxnSpPr>
+            <a:cxnSpLocks/>
+            <a:stCxn id="2" idx="3"/>
+          </p:cNvCxnSpPr>
+          <p:nvPr/>
+        </p:nvCxnSpPr>
+        <p:spPr>
+          <a:xfrm flipV="1">
+            <a:off x="2145558" y="2580056"/>
+            <a:ext cx="1559002" cy="848943"/>
+          </a:xfrm>
+          <a:prstGeom prst="straightConnector1">
+            <a:avLst/>
+          </a:prstGeom>
+          <a:ln>
+            <a:tailEnd type="triangle"/>
+          </a:ln>
+        </p:spPr>
+        <p:style>
+          <a:lnRef idx="1">
+            <a:schemeClr val="dk1"/>
+          </a:lnRef>
+          <a:fillRef idx="0">
+            <a:schemeClr val="dk1"/>
+          </a:fillRef>
+          <a:effectRef idx="0">
+            <a:schemeClr val="dk1"/>
+          </a:effectRef>
+          <a:fontRef idx="minor">
+            <a:schemeClr val="tx1"/>
+          </a:fontRef>
+        </p:style>
+      </p:cxnSp>
+      <p:cxnSp>
+        <p:nvCxnSpPr>
+          <p:cNvPr id="11" name="Straight Arrow Connector 10">
+            <a:extLst>
+              <a:ext uri="{FF2B5EF4-FFF2-40B4-BE49-F238E27FC236}">
+                <a16:creationId xmlns:a16="http://schemas.microsoft.com/office/drawing/2014/main" id="{E87F76D8-384A-6247-A379-4DA47769865B}"/>
+              </a:ext>
+            </a:extLst>
+          </p:cNvPr>
+          <p:cNvCxnSpPr>
+            <a:cxnSpLocks/>
+            <a:stCxn id="2" idx="3"/>
+          </p:cNvCxnSpPr>
+          <p:nvPr/>
+        </p:nvCxnSpPr>
+        <p:spPr>
+          <a:xfrm>
+            <a:off x="2145558" y="3428999"/>
+            <a:ext cx="1559002" cy="848946"/>
+          </a:xfrm>
+          <a:prstGeom prst="straightConnector1">
+            <a:avLst/>
+          </a:prstGeom>
+          <a:ln>
+            <a:tailEnd type="triangle"/>
+          </a:ln>
+        </p:spPr>
+        <p:style>
+          <a:lnRef idx="1">
+            <a:schemeClr val="dk1"/>
+          </a:lnRef>
+          <a:fillRef idx="0">
+            <a:schemeClr val="dk1"/>
+          </a:fillRef>
+          <a:effectRef idx="0">
+            <a:schemeClr val="dk1"/>
+          </a:effectRef>
+          <a:fontRef idx="minor">
+            <a:schemeClr val="tx1"/>
+          </a:fontRef>
+        </p:style>
+      </p:cxnSp>
+      <p:sp>
+        <p:nvSpPr>
+          <p:cNvPr id="14" name="Rectangle 13">
+            <a:extLst>
+              <a:ext uri="{FF2B5EF4-FFF2-40B4-BE49-F238E27FC236}">
+                <a16:creationId xmlns:a16="http://schemas.microsoft.com/office/drawing/2014/main" id="{CC7D9D65-44E3-9846-8468-406A36934380}"/>
+              </a:ext>
+            </a:extLst>
+          </p:cNvPr>
+          <p:cNvSpPr/>
+          <p:nvPr/>
+        </p:nvSpPr>
+        <p:spPr>
+          <a:xfrm>
+            <a:off x="4754081" y="2268721"/>
+            <a:ext cx="1604631" cy="622669"/>
+          </a:xfrm>
+          <a:prstGeom prst="rect">
+            <a:avLst/>
+          </a:prstGeom>
+          <a:solidFill>
+            <a:schemeClr val="bg2"/>
+          </a:solidFill>
+          <a:ln>
+            <a:noFill/>
+          </a:ln>
+        </p:spPr>
+        <p:style>
+          <a:lnRef idx="2">
+            <a:schemeClr val="accent1">
+              <a:shade val="50000"/>
+            </a:schemeClr>
+          </a:lnRef>
+          <a:fillRef idx="1">
+            <a:schemeClr val="accent1"/>
+          </a:fillRef>
+          <a:effectRef idx="0">
+            <a:schemeClr val="accent1"/>
+          </a:effectRef>
+          <a:fontRef idx="minor">
+            <a:schemeClr val="lt1"/>
+          </a:fontRef>
+        </p:style>
+        <p:txBody>
+          <a:bodyPr rtlCol="0" anchor="ctr"/>
+          <a:lstStyle/>
+          <a:p>
+            <a:pPr algn="ctr"/>
+            <a:r>
+              <a:rPr lang="en-US" sz="1400" dirty="0">
+                <a:ln w="0"/>
+                <a:solidFill>
+                  <a:schemeClr val="tx1"/>
+                </a:solidFill>
+                <a:effectLst>
+                  <a:outerShdw blurRad="38100" dist="19050" dir="2700000" algn="tl" rotWithShape="0">
+                    <a:schemeClr val="dk1">
+                      <a:alpha val="40000"/>
+                    </a:schemeClr>
+                  </a:outerShdw>
+                </a:effectLst>
+                <a:latin typeface="Helvetica Neue" panose="02000503000000020004" pitchFamily="2" charset="0"/>
+                <a:ea typeface="Helvetica Neue" panose="02000503000000020004" pitchFamily="2" charset="0"/>
+                <a:cs typeface="Helvetica Neue" panose="02000503000000020004" pitchFamily="2" charset="0"/>
+              </a:rPr>
+              <a:t>Store md File in a folder</a:t>
+            </a:r>
+          </a:p>
+        </p:txBody>
+      </p:sp>
+      <p:sp>
+        <p:nvSpPr>
+          <p:cNvPr id="18" name="Rectangle 17">
+            <a:extLst>
+              <a:ext uri="{FF2B5EF4-FFF2-40B4-BE49-F238E27FC236}">
+                <a16:creationId xmlns:a16="http://schemas.microsoft.com/office/drawing/2014/main" id="{523016A5-DA37-B94A-A909-3D1C017063BE}"/>
+              </a:ext>
+            </a:extLst>
+          </p:cNvPr>
+          <p:cNvSpPr/>
+          <p:nvPr/>
+        </p:nvSpPr>
+        <p:spPr>
+          <a:xfrm>
+            <a:off x="4754081" y="3966608"/>
+            <a:ext cx="1604631" cy="622669"/>
+          </a:xfrm>
+          <a:prstGeom prst="rect">
+            <a:avLst/>
+          </a:prstGeom>
+          <a:solidFill>
+            <a:schemeClr val="bg2"/>
+          </a:solidFill>
+          <a:ln>
+            <a:noFill/>
+          </a:ln>
+        </p:spPr>
+        <p:style>
+          <a:lnRef idx="2">
+            <a:schemeClr val="accent1">
+              <a:shade val="50000"/>
+            </a:schemeClr>
+          </a:lnRef>
+          <a:fillRef idx="1">
+            <a:schemeClr val="accent1"/>
+          </a:fillRef>
+          <a:effectRef idx="0">
+            <a:schemeClr val="accent1"/>
+          </a:effectRef>
+          <a:fontRef idx="minor">
+            <a:schemeClr val="lt1"/>
+          </a:fontRef>
+        </p:style>
+        <p:txBody>
+          <a:bodyPr rtlCol="0" anchor="ctr"/>
+          <a:lstStyle/>
+          <a:p>
+            <a:pPr algn="ctr"/>
+            <a:r>
+              <a:rPr lang="en-US" sz="1400" dirty="0">
+                <a:ln w="0"/>
+                <a:solidFill>
+                  <a:schemeClr val="tx1"/>
+                </a:solidFill>
+                <a:effectLst>
+                  <a:outerShdw blurRad="38100" dist="19050" dir="2700000" algn="tl" rotWithShape="0">
+                    <a:schemeClr val="dk1">
+                      <a:alpha val="40000"/>
+                    </a:schemeClr>
+                  </a:outerShdw>
+                </a:effectLst>
+                <a:latin typeface="Helvetica Neue" panose="02000503000000020004" pitchFamily="2" charset="0"/>
+                <a:ea typeface="Helvetica Neue" panose="02000503000000020004" pitchFamily="2" charset="0"/>
+                <a:cs typeface="Helvetica Neue" panose="02000503000000020004" pitchFamily="2" charset="0"/>
+              </a:rPr>
+              <a:t>Store md File in a folder</a:t>
+            </a:r>
+          </a:p>
+        </p:txBody>
+      </p:sp>
+      <p:cxnSp>
+        <p:nvCxnSpPr>
+          <p:cNvPr id="25" name="Straight Arrow Connector 24">
+            <a:extLst>
+              <a:ext uri="{FF2B5EF4-FFF2-40B4-BE49-F238E27FC236}">
+                <a16:creationId xmlns:a16="http://schemas.microsoft.com/office/drawing/2014/main" id="{CAE4C1B0-83D5-7B48-A800-22FA87DBB7CE}"/>
+              </a:ext>
+            </a:extLst>
+          </p:cNvPr>
+          <p:cNvCxnSpPr>
+            <a:cxnSpLocks/>
+            <a:endCxn id="14" idx="1"/>
+          </p:cNvCxnSpPr>
+          <p:nvPr/>
+        </p:nvCxnSpPr>
+        <p:spPr>
+          <a:xfrm flipV="1">
+            <a:off x="4097966" y="2580056"/>
+            <a:ext cx="656115" cy="1"/>
+          </a:xfrm>
+          <a:prstGeom prst="straightConnector1">
+            <a:avLst/>
+          </a:prstGeom>
+          <a:ln>
+            <a:tailEnd type="triangle"/>
+          </a:ln>
+        </p:spPr>
+        <p:style>
+          <a:lnRef idx="1">
+            <a:schemeClr val="dk1"/>
+          </a:lnRef>
+          <a:fillRef idx="0">
+            <a:schemeClr val="dk1"/>
+          </a:fillRef>
+          <a:effectRef idx="0">
+            <a:schemeClr val="dk1"/>
+          </a:effectRef>
+          <a:fontRef idx="minor">
+            <a:schemeClr val="tx1"/>
+          </a:fontRef>
+        </p:style>
+      </p:cxnSp>
+      <p:cxnSp>
+        <p:nvCxnSpPr>
+          <p:cNvPr id="34" name="Straight Arrow Connector 33">
+            <a:extLst>
+              <a:ext uri="{FF2B5EF4-FFF2-40B4-BE49-F238E27FC236}">
+                <a16:creationId xmlns:a16="http://schemas.microsoft.com/office/drawing/2014/main" id="{32123974-64ED-254A-B509-5ED227C1C664}"/>
+              </a:ext>
+            </a:extLst>
+          </p:cNvPr>
+          <p:cNvCxnSpPr>
+            <a:cxnSpLocks/>
+            <a:endCxn id="18" idx="1"/>
+          </p:cNvCxnSpPr>
+          <p:nvPr/>
+        </p:nvCxnSpPr>
+        <p:spPr>
+          <a:xfrm flipV="1">
+            <a:off x="4097965" y="4277943"/>
+            <a:ext cx="656116" cy="1"/>
+          </a:xfrm>
+          <a:prstGeom prst="straightConnector1">
+            <a:avLst/>
+          </a:prstGeom>
+          <a:ln>
+            <a:tailEnd type="triangle"/>
+          </a:ln>
+        </p:spPr>
+        <p:style>
+          <a:lnRef idx="1">
+            <a:schemeClr val="dk1"/>
+          </a:lnRef>
+          <a:fillRef idx="0">
+            <a:schemeClr val="dk1"/>
+          </a:fillRef>
+          <a:effectRef idx="0">
+            <a:schemeClr val="dk1"/>
+          </a:effectRef>
+          <a:fontRef idx="minor">
+            <a:schemeClr val="tx1"/>
+          </a:fontRef>
+        </p:style>
+      </p:cxnSp>
+      <p:cxnSp>
+        <p:nvCxnSpPr>
+          <p:cNvPr id="20" name="Straight Arrow Connector 19">
+            <a:extLst>
+              <a:ext uri="{FF2B5EF4-FFF2-40B4-BE49-F238E27FC236}">
+                <a16:creationId xmlns:a16="http://schemas.microsoft.com/office/drawing/2014/main" id="{FF46346F-B099-EF41-957E-A6D0F239FF3B}"/>
+              </a:ext>
+            </a:extLst>
+          </p:cNvPr>
+          <p:cNvCxnSpPr>
+            <a:cxnSpLocks/>
+            <a:stCxn id="14" idx="3"/>
+            <a:endCxn id="23" idx="1"/>
+          </p:cNvCxnSpPr>
+          <p:nvPr/>
+        </p:nvCxnSpPr>
+        <p:spPr>
+          <a:xfrm>
+            <a:off x="6358712" y="2580056"/>
+            <a:ext cx="1049521" cy="842796"/>
+          </a:xfrm>
+          <a:prstGeom prst="straightConnector1">
+            <a:avLst/>
+          </a:prstGeom>
+          <a:ln>
+            <a:tailEnd type="triangle"/>
+          </a:ln>
+        </p:spPr>
+        <p:style>
+          <a:lnRef idx="1">
+            <a:schemeClr val="dk1"/>
+          </a:lnRef>
+          <a:fillRef idx="0">
+            <a:schemeClr val="dk1"/>
+          </a:fillRef>
+          <a:effectRef idx="0">
+            <a:schemeClr val="dk1"/>
+          </a:effectRef>
+          <a:fontRef idx="minor">
+            <a:schemeClr val="tx1"/>
+          </a:fontRef>
+        </p:style>
+      </p:cxnSp>
+      <p:sp>
+        <p:nvSpPr>
+          <p:cNvPr id="23" name="Rectangle 22">
+            <a:extLst>
+              <a:ext uri="{FF2B5EF4-FFF2-40B4-BE49-F238E27FC236}">
+                <a16:creationId xmlns:a16="http://schemas.microsoft.com/office/drawing/2014/main" id="{4C23B378-D384-3148-A175-EB453C1499D0}"/>
+              </a:ext>
+            </a:extLst>
+          </p:cNvPr>
+          <p:cNvSpPr/>
+          <p:nvPr/>
+        </p:nvSpPr>
+        <p:spPr>
+          <a:xfrm>
+            <a:off x="7408233" y="2800182"/>
+            <a:ext cx="1604631" cy="1245339"/>
+          </a:xfrm>
+          <a:prstGeom prst="rect">
+            <a:avLst/>
+          </a:prstGeom>
+          <a:solidFill>
+            <a:schemeClr val="bg2"/>
+          </a:solidFill>
+          <a:ln>
+            <a:noFill/>
+          </a:ln>
+        </p:spPr>
+        <p:style>
+          <a:lnRef idx="2">
+            <a:schemeClr val="accent1">
+              <a:shade val="50000"/>
+            </a:schemeClr>
+          </a:lnRef>
+          <a:fillRef idx="1">
+            <a:schemeClr val="accent1"/>
+          </a:fillRef>
+          <a:effectRef idx="0">
+            <a:schemeClr val="accent1"/>
+          </a:effectRef>
+          <a:fontRef idx="minor">
+            <a:schemeClr val="lt1"/>
+          </a:fontRef>
+        </p:style>
+        <p:txBody>
+          <a:bodyPr rtlCol="0" anchor="ctr"/>
+          <a:lstStyle/>
+          <a:p>
+            <a:pPr algn="ctr"/>
+            <a:r>
+              <a:rPr lang="en-US" sz="1400" dirty="0">
+                <a:ln w="0"/>
+                <a:solidFill>
+                  <a:schemeClr val="tx1"/>
+                </a:solidFill>
+                <a:effectLst>
+                  <a:outerShdw blurRad="38100" dist="19050" dir="2700000" algn="tl" rotWithShape="0">
+                    <a:schemeClr val="dk1">
+                      <a:alpha val="40000"/>
+                    </a:schemeClr>
+                  </a:outerShdw>
+                </a:effectLst>
+                <a:latin typeface="Helvetica Neue" panose="02000503000000020004" pitchFamily="2" charset="0"/>
+                <a:ea typeface="Helvetica Neue" panose="02000503000000020004" pitchFamily="2" charset="0"/>
+                <a:cs typeface="Helvetica Neue" panose="02000503000000020004" pitchFamily="2" charset="0"/>
+              </a:rPr>
+              <a:t>We now have a folder containing every md file of every file and folder</a:t>
+            </a:r>
+          </a:p>
+        </p:txBody>
+      </p:sp>
+      <p:cxnSp>
+        <p:nvCxnSpPr>
+          <p:cNvPr id="26" name="Straight Arrow Connector 25">
+            <a:extLst>
+              <a:ext uri="{FF2B5EF4-FFF2-40B4-BE49-F238E27FC236}">
+                <a16:creationId xmlns:a16="http://schemas.microsoft.com/office/drawing/2014/main" id="{60B4AC62-6BBC-EB46-AAB7-3EC2968C6C4D}"/>
+              </a:ext>
+            </a:extLst>
+          </p:cNvPr>
+          <p:cNvCxnSpPr>
+            <a:cxnSpLocks/>
+            <a:stCxn id="18" idx="3"/>
+            <a:endCxn id="23" idx="1"/>
+          </p:cNvCxnSpPr>
+          <p:nvPr/>
+        </p:nvCxnSpPr>
+        <p:spPr>
+          <a:xfrm flipV="1">
+            <a:off x="6358712" y="3422852"/>
+            <a:ext cx="1049521" cy="855091"/>
+          </a:xfrm>
+          <a:prstGeom prst="straightConnector1">
+            <a:avLst/>
+          </a:prstGeom>
+          <a:ln>
+            <a:tailEnd type="triangle"/>
+          </a:ln>
+        </p:spPr>
+        <p:style>
+          <a:lnRef idx="1">
+            <a:schemeClr val="dk1"/>
+          </a:lnRef>
+          <a:fillRef idx="0">
+            <a:schemeClr val="dk1"/>
+          </a:fillRef>
+          <a:effectRef idx="0">
+            <a:schemeClr val="dk1"/>
+          </a:effectRef>
+          <a:fontRef idx="minor">
+            <a:schemeClr val="tx1"/>
+          </a:fontRef>
+        </p:style>
+      </p:cxnSp>
+    </p:spTree>
+    <p:extLst>
+      <p:ext uri="{BB962C8B-B14F-4D97-AF65-F5344CB8AC3E}">
+        <p14:creationId xmlns:p14="http://schemas.microsoft.com/office/powerpoint/2010/main" val="909472706"/>
+      </p:ext>
+    </p:extLst>
+  </p:cSld>
+  <p:clrMapOvr>
+    <a:masterClrMapping/>
+  </p:clrMapOvr>
+  <mc:AlternateContent xmlns:mc="http://schemas.openxmlformats.org/markup-compatibility/2006">
+    <mc:Choice xmlns:p159="http://schemas.microsoft.com/office/powerpoint/2015/09/main" Requires="p159">
+      <p:transition xmlns:p14="http://schemas.microsoft.com/office/powerpoint/2010/main" spd="slow" p14:dur="2000">
+        <p159:morph option="byObject"/>
+      </p:transition>
+    </mc:Choice>
+    <mc:Fallback>
+      <p:transition spd="slow">
+        <p:fade/>
+      </p:transition>
+    </mc:Fallback>
+  </mc:AlternateContent>
+</p:sld>
+</file>
+
+<file path=ppt/slides/slide16.xml><?xml version="1.0" encoding="utf-8"?>
+<p:sld xmlns:a="http://schemas.openxmlformats.org/drawingml/2006/main" xmlns:r="http://schemas.openxmlformats.org/officeDocument/2006/relationships" xmlns:p="http://schemas.openxmlformats.org/presentationml/2006/main">
+  <p:cSld>
+    <p:spTree>
+      <p:nvGrpSpPr>
+        <p:cNvPr id="1" name=""/>
+        <p:cNvGrpSpPr/>
+        <p:nvPr/>
+      </p:nvGrpSpPr>
+      <p:grpSpPr>
+        <a:xfrm>
+          <a:off x="0" y="0"/>
+          <a:ext cx="0" cy="0"/>
+          <a:chOff x="0" y="0"/>
+          <a:chExt cx="0" cy="0"/>
+        </a:xfrm>
+      </p:grpSpPr>
+      <p:sp>
+        <p:nvSpPr>
+          <p:cNvPr id="2" name="Rectangle 1">
+            <a:extLst>
+              <a:ext uri="{FF2B5EF4-FFF2-40B4-BE49-F238E27FC236}">
+                <a16:creationId xmlns:a16="http://schemas.microsoft.com/office/drawing/2014/main" id="{C187AEBA-957E-BF46-8078-38ABFF1D9603}"/>
+              </a:ext>
+            </a:extLst>
+          </p:cNvPr>
+          <p:cNvSpPr/>
+          <p:nvPr/>
+        </p:nvSpPr>
+        <p:spPr>
+          <a:xfrm>
+            <a:off x="540927" y="2806329"/>
+            <a:ext cx="1604631" cy="1245339"/>
+          </a:xfrm>
+          <a:prstGeom prst="rect">
+            <a:avLst/>
+          </a:prstGeom>
+          <a:solidFill>
+            <a:schemeClr val="bg2"/>
+          </a:solidFill>
+          <a:ln>
+            <a:noFill/>
+          </a:ln>
+        </p:spPr>
+        <p:style>
+          <a:lnRef idx="2">
+            <a:schemeClr val="accent1">
+              <a:shade val="50000"/>
+            </a:schemeClr>
+          </a:lnRef>
+          <a:fillRef idx="1">
+            <a:schemeClr val="accent1"/>
+          </a:fillRef>
+          <a:effectRef idx="0">
+            <a:schemeClr val="accent1"/>
+          </a:effectRef>
+          <a:fontRef idx="minor">
+            <a:schemeClr val="lt1"/>
+          </a:fontRef>
+        </p:style>
+        <p:txBody>
+          <a:bodyPr rtlCol="0" anchor="ctr"/>
+          <a:lstStyle/>
+          <a:p>
+            <a:pPr algn="ctr"/>
+            <a:r>
+              <a:rPr lang="en-US" sz="1400" dirty="0">
+                <a:ln w="0"/>
+                <a:solidFill>
+                  <a:schemeClr val="tx1"/>
+                </a:solidFill>
+                <a:effectLst>
+                  <a:outerShdw blurRad="38100" dist="19050" dir="2700000" algn="tl" rotWithShape="0">
+                    <a:schemeClr val="dk1">
+                      <a:alpha val="40000"/>
+                    </a:schemeClr>
+                  </a:outerShdw>
+                </a:effectLst>
+                <a:latin typeface="Helvetica Neue" panose="02000503000000020004" pitchFamily="2" charset="0"/>
+                <a:ea typeface="Helvetica Neue" panose="02000503000000020004" pitchFamily="2" charset="0"/>
+                <a:cs typeface="Helvetica Neue" panose="02000503000000020004" pitchFamily="2" charset="0"/>
+              </a:rPr>
+              <a:t>The project</a:t>
+            </a:r>
+          </a:p>
+        </p:txBody>
+      </p:sp>
+      <p:sp>
+        <p:nvSpPr>
+          <p:cNvPr id="3" name="Rectangle 2">
+            <a:extLst>
+              <a:ext uri="{FF2B5EF4-FFF2-40B4-BE49-F238E27FC236}">
+                <a16:creationId xmlns:a16="http://schemas.microsoft.com/office/drawing/2014/main" id="{5FD2B055-1CF7-C944-91EA-71A5DE661763}"/>
+              </a:ext>
+            </a:extLst>
+          </p:cNvPr>
+          <p:cNvSpPr/>
+          <p:nvPr/>
+        </p:nvSpPr>
+        <p:spPr>
+          <a:xfrm>
+            <a:off x="12192000" y="2183661"/>
+            <a:ext cx="2604977" cy="2490677"/>
+          </a:xfrm>
+          <a:prstGeom prst="rect">
+            <a:avLst/>
+          </a:prstGeom>
+          <a:solidFill>
+            <a:schemeClr val="bg2"/>
+          </a:solidFill>
+          <a:ln>
+            <a:noFill/>
+          </a:ln>
+        </p:spPr>
+        <p:style>
+          <a:lnRef idx="2">
+            <a:schemeClr val="accent1">
+              <a:shade val="50000"/>
+            </a:schemeClr>
+          </a:lnRef>
+          <a:fillRef idx="1">
+            <a:schemeClr val="accent1"/>
+          </a:fillRef>
+          <a:effectRef idx="0">
+            <a:schemeClr val="accent1"/>
+          </a:effectRef>
+          <a:fontRef idx="minor">
+            <a:schemeClr val="lt1"/>
+          </a:fontRef>
+        </p:style>
+        <p:txBody>
+          <a:bodyPr rtlCol="0" anchor="ctr"/>
+          <a:lstStyle/>
+          <a:p>
+            <a:pPr algn="ctr"/>
+            <a:r>
+              <a:rPr lang="en-US" dirty="0">
+                <a:solidFill>
+                  <a:schemeClr val="tx1"/>
+                </a:solidFill>
+                <a:latin typeface="Helvetica Neue" panose="02000503000000020004" pitchFamily="2" charset="0"/>
+                <a:ea typeface="Helvetica Neue" panose="02000503000000020004" pitchFamily="2" charset="0"/>
+                <a:cs typeface="Helvetica Neue" panose="02000503000000020004" pitchFamily="2" charset="0"/>
+              </a:rPr>
+              <a:t>Full Documentation</a:t>
+            </a:r>
+          </a:p>
+        </p:txBody>
+      </p:sp>
+      <p:cxnSp>
+        <p:nvCxnSpPr>
+          <p:cNvPr id="5" name="Straight Arrow Connector 4">
+            <a:extLst>
+              <a:ext uri="{FF2B5EF4-FFF2-40B4-BE49-F238E27FC236}">
+                <a16:creationId xmlns:a16="http://schemas.microsoft.com/office/drawing/2014/main" id="{A665726E-500A-7B45-8378-F42CC6F7B5F9}"/>
+              </a:ext>
+            </a:extLst>
+          </p:cNvPr>
+          <p:cNvCxnSpPr>
+            <a:cxnSpLocks/>
+            <a:stCxn id="2" idx="3"/>
+          </p:cNvCxnSpPr>
+          <p:nvPr/>
+        </p:nvCxnSpPr>
+        <p:spPr>
+          <a:xfrm flipV="1">
+            <a:off x="2145558" y="2580056"/>
+            <a:ext cx="1559002" cy="848943"/>
+          </a:xfrm>
+          <a:prstGeom prst="straightConnector1">
+            <a:avLst/>
+          </a:prstGeom>
+          <a:ln>
+            <a:tailEnd type="triangle"/>
+          </a:ln>
+        </p:spPr>
+        <p:style>
+          <a:lnRef idx="1">
+            <a:schemeClr val="dk1"/>
+          </a:lnRef>
+          <a:fillRef idx="0">
+            <a:schemeClr val="dk1"/>
+          </a:fillRef>
+          <a:effectRef idx="0">
+            <a:schemeClr val="dk1"/>
+          </a:effectRef>
+          <a:fontRef idx="minor">
+            <a:schemeClr val="tx1"/>
+          </a:fontRef>
+        </p:style>
+      </p:cxnSp>
+      <p:cxnSp>
+        <p:nvCxnSpPr>
+          <p:cNvPr id="11" name="Straight Arrow Connector 10">
+            <a:extLst>
+              <a:ext uri="{FF2B5EF4-FFF2-40B4-BE49-F238E27FC236}">
+                <a16:creationId xmlns:a16="http://schemas.microsoft.com/office/drawing/2014/main" id="{E87F76D8-384A-6247-A379-4DA47769865B}"/>
+              </a:ext>
+            </a:extLst>
+          </p:cNvPr>
+          <p:cNvCxnSpPr>
+            <a:cxnSpLocks/>
+            <a:stCxn id="2" idx="3"/>
+          </p:cNvCxnSpPr>
+          <p:nvPr/>
+        </p:nvCxnSpPr>
+        <p:spPr>
+          <a:xfrm>
+            <a:off x="2145558" y="3428999"/>
+            <a:ext cx="1559002" cy="848946"/>
+          </a:xfrm>
+          <a:prstGeom prst="straightConnector1">
+            <a:avLst/>
+          </a:prstGeom>
+          <a:ln>
+            <a:tailEnd type="triangle"/>
+          </a:ln>
+        </p:spPr>
+        <p:style>
+          <a:lnRef idx="1">
+            <a:schemeClr val="dk1"/>
+          </a:lnRef>
+          <a:fillRef idx="0">
+            <a:schemeClr val="dk1"/>
+          </a:fillRef>
+          <a:effectRef idx="0">
+            <a:schemeClr val="dk1"/>
+          </a:effectRef>
+          <a:fontRef idx="minor">
+            <a:schemeClr val="tx1"/>
+          </a:fontRef>
+        </p:style>
+      </p:cxnSp>
+      <p:cxnSp>
+        <p:nvCxnSpPr>
+          <p:cNvPr id="20" name="Straight Arrow Connector 19">
+            <a:extLst>
+              <a:ext uri="{FF2B5EF4-FFF2-40B4-BE49-F238E27FC236}">
+                <a16:creationId xmlns:a16="http://schemas.microsoft.com/office/drawing/2014/main" id="{FF46346F-B099-EF41-957E-A6D0F239FF3B}"/>
+              </a:ext>
+            </a:extLst>
+          </p:cNvPr>
+          <p:cNvCxnSpPr>
+            <a:cxnSpLocks/>
+            <a:endCxn id="23" idx="1"/>
+          </p:cNvCxnSpPr>
+          <p:nvPr/>
+        </p:nvCxnSpPr>
+        <p:spPr>
+          <a:xfrm>
+            <a:off x="4259670" y="2586203"/>
+            <a:ext cx="1049521" cy="842796"/>
+          </a:xfrm>
+          <a:prstGeom prst="straightConnector1">
+            <a:avLst/>
+          </a:prstGeom>
+          <a:ln>
+            <a:tailEnd type="triangle"/>
+          </a:ln>
+        </p:spPr>
+        <p:style>
+          <a:lnRef idx="1">
+            <a:schemeClr val="dk1"/>
+          </a:lnRef>
+          <a:fillRef idx="0">
+            <a:schemeClr val="dk1"/>
+          </a:fillRef>
+          <a:effectRef idx="0">
+            <a:schemeClr val="dk1"/>
+          </a:effectRef>
+          <a:fontRef idx="minor">
+            <a:schemeClr val="tx1"/>
+          </a:fontRef>
+        </p:style>
+      </p:cxnSp>
+      <p:sp>
+        <p:nvSpPr>
+          <p:cNvPr id="23" name="Rectangle 22">
+            <a:extLst>
+              <a:ext uri="{FF2B5EF4-FFF2-40B4-BE49-F238E27FC236}">
+                <a16:creationId xmlns:a16="http://schemas.microsoft.com/office/drawing/2014/main" id="{4C23B378-D384-3148-A175-EB453C1499D0}"/>
+              </a:ext>
+            </a:extLst>
+          </p:cNvPr>
+          <p:cNvSpPr/>
+          <p:nvPr/>
+        </p:nvSpPr>
+        <p:spPr>
+          <a:xfrm>
+            <a:off x="5309191" y="2806329"/>
+            <a:ext cx="1604631" cy="1245339"/>
+          </a:xfrm>
+          <a:prstGeom prst="rect">
+            <a:avLst/>
+          </a:prstGeom>
+          <a:solidFill>
+            <a:schemeClr val="bg2"/>
+          </a:solidFill>
+          <a:ln>
+            <a:noFill/>
+          </a:ln>
+        </p:spPr>
+        <p:style>
+          <a:lnRef idx="2">
+            <a:schemeClr val="accent1">
+              <a:shade val="50000"/>
+            </a:schemeClr>
+          </a:lnRef>
+          <a:fillRef idx="1">
+            <a:schemeClr val="accent1"/>
+          </a:fillRef>
+          <a:effectRef idx="0">
+            <a:schemeClr val="accent1"/>
+          </a:effectRef>
+          <a:fontRef idx="minor">
+            <a:schemeClr val="lt1"/>
+          </a:fontRef>
+        </p:style>
+        <p:txBody>
+          <a:bodyPr rtlCol="0" anchor="ctr"/>
+          <a:lstStyle/>
+          <a:p>
+            <a:pPr algn="ctr"/>
+            <a:r>
+              <a:rPr lang="en-US" sz="1400" dirty="0">
+                <a:ln w="0"/>
+                <a:solidFill>
+                  <a:schemeClr val="tx1"/>
+                </a:solidFill>
+                <a:effectLst>
+                  <a:outerShdw blurRad="38100" dist="19050" dir="2700000" algn="tl" rotWithShape="0">
+                    <a:schemeClr val="dk1">
+                      <a:alpha val="40000"/>
+                    </a:schemeClr>
+                  </a:outerShdw>
+                </a:effectLst>
+                <a:latin typeface="Helvetica Neue" panose="02000503000000020004" pitchFamily="2" charset="0"/>
+                <a:ea typeface="Helvetica Neue" panose="02000503000000020004" pitchFamily="2" charset="0"/>
+                <a:cs typeface="Helvetica Neue" panose="02000503000000020004" pitchFamily="2" charset="0"/>
+              </a:rPr>
+              <a:t>We now have a folder containing every md file of every file and folder</a:t>
+            </a:r>
+          </a:p>
+        </p:txBody>
+      </p:sp>
+      <p:cxnSp>
+        <p:nvCxnSpPr>
+          <p:cNvPr id="26" name="Straight Arrow Connector 25">
+            <a:extLst>
+              <a:ext uri="{FF2B5EF4-FFF2-40B4-BE49-F238E27FC236}">
+                <a16:creationId xmlns:a16="http://schemas.microsoft.com/office/drawing/2014/main" id="{60B4AC62-6BBC-EB46-AAB7-3EC2968C6C4D}"/>
+              </a:ext>
+            </a:extLst>
+          </p:cNvPr>
+          <p:cNvCxnSpPr>
+            <a:cxnSpLocks/>
+            <a:endCxn id="23" idx="1"/>
+          </p:cNvCxnSpPr>
+          <p:nvPr/>
+        </p:nvCxnSpPr>
+        <p:spPr>
+          <a:xfrm flipV="1">
+            <a:off x="4259670" y="3428999"/>
+            <a:ext cx="1049521" cy="855091"/>
+          </a:xfrm>
+          <a:prstGeom prst="straightConnector1">
+            <a:avLst/>
+          </a:prstGeom>
+          <a:ln>
+            <a:tailEnd type="triangle"/>
+          </a:ln>
+        </p:spPr>
+        <p:style>
+          <a:lnRef idx="1">
+            <a:schemeClr val="dk1"/>
+          </a:lnRef>
+          <a:fillRef idx="0">
+            <a:schemeClr val="dk1"/>
+          </a:fillRef>
+          <a:effectRef idx="0">
+            <a:schemeClr val="dk1"/>
+          </a:effectRef>
+          <a:fontRef idx="minor">
+            <a:schemeClr val="tx1"/>
+          </a:fontRef>
+        </p:style>
+      </p:cxnSp>
+      <p:cxnSp>
+        <p:nvCxnSpPr>
+          <p:cNvPr id="13" name="Straight Arrow Connector 12">
+            <a:extLst>
+              <a:ext uri="{FF2B5EF4-FFF2-40B4-BE49-F238E27FC236}">
+                <a16:creationId xmlns:a16="http://schemas.microsoft.com/office/drawing/2014/main" id="{A449C8B4-88D2-E54D-9CF3-19E4242F4B8E}"/>
+              </a:ext>
+            </a:extLst>
+          </p:cNvPr>
+          <p:cNvCxnSpPr>
+            <a:cxnSpLocks/>
+            <a:stCxn id="23" idx="3"/>
+            <a:endCxn id="16" idx="1"/>
+          </p:cNvCxnSpPr>
+          <p:nvPr/>
+        </p:nvCxnSpPr>
+        <p:spPr>
+          <a:xfrm>
+            <a:off x="6913822" y="3428999"/>
+            <a:ext cx="786364" cy="0"/>
+          </a:xfrm>
+          <a:prstGeom prst="straightConnector1">
+            <a:avLst/>
+          </a:prstGeom>
+          <a:ln>
+            <a:tailEnd type="triangle"/>
+          </a:ln>
+        </p:spPr>
+        <p:style>
+          <a:lnRef idx="1">
+            <a:schemeClr val="dk1"/>
+          </a:lnRef>
+          <a:fillRef idx="0">
+            <a:schemeClr val="dk1"/>
+          </a:fillRef>
+          <a:effectRef idx="0">
+            <a:schemeClr val="dk1"/>
+          </a:effectRef>
+          <a:fontRef idx="minor">
+            <a:schemeClr val="tx1"/>
+          </a:fontRef>
+        </p:style>
+      </p:cxnSp>
+      <p:sp>
+        <p:nvSpPr>
+          <p:cNvPr id="16" name="Rectangle 15">
+            <a:extLst>
+              <a:ext uri="{FF2B5EF4-FFF2-40B4-BE49-F238E27FC236}">
+                <a16:creationId xmlns:a16="http://schemas.microsoft.com/office/drawing/2014/main" id="{9238EC61-E662-144A-B487-AE41A66F5645}"/>
+              </a:ext>
+            </a:extLst>
+          </p:cNvPr>
+          <p:cNvSpPr/>
+          <p:nvPr/>
+        </p:nvSpPr>
+        <p:spPr>
+          <a:xfrm>
+            <a:off x="7700186" y="2806329"/>
+            <a:ext cx="1604631" cy="1245339"/>
+          </a:xfrm>
+          <a:prstGeom prst="rect">
+            <a:avLst/>
+          </a:prstGeom>
+          <a:solidFill>
+            <a:schemeClr val="bg2"/>
+          </a:solidFill>
+          <a:ln>
+            <a:noFill/>
+          </a:ln>
+        </p:spPr>
+        <p:style>
+          <a:lnRef idx="2">
+            <a:schemeClr val="accent1">
+              <a:shade val="50000"/>
+            </a:schemeClr>
+          </a:lnRef>
+          <a:fillRef idx="1">
+            <a:schemeClr val="accent1"/>
+          </a:fillRef>
+          <a:effectRef idx="0">
+            <a:schemeClr val="accent1"/>
+          </a:effectRef>
+          <a:fontRef idx="minor">
+            <a:schemeClr val="lt1"/>
+          </a:fontRef>
+        </p:style>
+        <p:txBody>
+          <a:bodyPr rtlCol="0" anchor="ctr"/>
+          <a:lstStyle/>
+          <a:p>
+            <a:pPr algn="ctr"/>
+            <a:r>
+              <a:rPr lang="en-US" sz="1400" dirty="0">
+                <a:ln w="0"/>
+                <a:solidFill>
+                  <a:schemeClr val="tx1"/>
+                </a:solidFill>
+                <a:effectLst>
+                  <a:outerShdw blurRad="38100" dist="19050" dir="2700000" algn="tl" rotWithShape="0">
+                    <a:schemeClr val="dk1">
+                      <a:alpha val="40000"/>
+                    </a:schemeClr>
+                  </a:outerShdw>
+                </a:effectLst>
+                <a:latin typeface="Helvetica Neue" panose="02000503000000020004" pitchFamily="2" charset="0"/>
+                <a:ea typeface="Helvetica Neue" panose="02000503000000020004" pitchFamily="2" charset="0"/>
+                <a:cs typeface="Helvetica Neue" panose="02000503000000020004" pitchFamily="2" charset="0"/>
+              </a:rPr>
+              <a:t>We run a function that write the master documentation file in order</a:t>
+            </a:r>
+          </a:p>
+        </p:txBody>
+      </p:sp>
+    </p:spTree>
+    <p:extLst>
+      <p:ext uri="{BB962C8B-B14F-4D97-AF65-F5344CB8AC3E}">
+        <p14:creationId xmlns:p14="http://schemas.microsoft.com/office/powerpoint/2010/main" val="1155818542"/>
+      </p:ext>
+    </p:extLst>
+  </p:cSld>
+  <p:clrMapOvr>
+    <a:masterClrMapping/>
+  </p:clrMapOvr>
+  <mc:AlternateContent xmlns:mc="http://schemas.openxmlformats.org/markup-compatibility/2006">
+    <mc:Choice xmlns:p159="http://schemas.microsoft.com/office/powerpoint/2015/09/main" Requires="p159">
+      <p:transition xmlns:p14="http://schemas.microsoft.com/office/powerpoint/2010/main" spd="slow" p14:dur="2000">
+        <p159:morph option="byObject"/>
+      </p:transition>
+    </mc:Choice>
+    <mc:Fallback>
+      <p:transition spd="slow">
+        <p:fade/>
+      </p:transition>
+    </mc:Fallback>
+  </mc:AlternateContent>
+</p:sld>
+</file>
+
+<file path=ppt/slides/slide17.xml><?xml version="1.0" encoding="utf-8"?>
+<p:sld xmlns:a="http://schemas.openxmlformats.org/drawingml/2006/main" xmlns:r="http://schemas.openxmlformats.org/officeDocument/2006/relationships" xmlns:p="http://schemas.openxmlformats.org/presentationml/2006/main">
+  <p:cSld>
+    <p:spTree>
+      <p:nvGrpSpPr>
+        <p:cNvPr id="1" name=""/>
+        <p:cNvGrpSpPr/>
+        <p:nvPr/>
+      </p:nvGrpSpPr>
+      <p:grpSpPr>
+        <a:xfrm>
+          <a:off x="0" y="0"/>
+          <a:ext cx="0" cy="0"/>
+          <a:chOff x="0" y="0"/>
+          <a:chExt cx="0" cy="0"/>
+        </a:xfrm>
+      </p:grpSpPr>
+      <p:sp>
+        <p:nvSpPr>
+          <p:cNvPr id="2" name="Rectangle 1">
+            <a:extLst>
+              <a:ext uri="{FF2B5EF4-FFF2-40B4-BE49-F238E27FC236}">
+                <a16:creationId xmlns:a16="http://schemas.microsoft.com/office/drawing/2014/main" id="{C187AEBA-957E-BF46-8078-38ABFF1D9603}"/>
+              </a:ext>
+            </a:extLst>
+          </p:cNvPr>
+          <p:cNvSpPr/>
+          <p:nvPr/>
+        </p:nvSpPr>
+        <p:spPr>
+          <a:xfrm>
+            <a:off x="540927" y="2806329"/>
+            <a:ext cx="1604631" cy="1245339"/>
+          </a:xfrm>
+          <a:prstGeom prst="rect">
+            <a:avLst/>
+          </a:prstGeom>
+          <a:solidFill>
+            <a:schemeClr val="bg2"/>
+          </a:solidFill>
+          <a:ln>
+            <a:noFill/>
+          </a:ln>
+        </p:spPr>
+        <p:style>
+          <a:lnRef idx="2">
+            <a:schemeClr val="accent1">
+              <a:shade val="50000"/>
+            </a:schemeClr>
+          </a:lnRef>
+          <a:fillRef idx="1">
+            <a:schemeClr val="accent1"/>
+          </a:fillRef>
+          <a:effectRef idx="0">
+            <a:schemeClr val="accent1"/>
+          </a:effectRef>
+          <a:fontRef idx="minor">
+            <a:schemeClr val="lt1"/>
+          </a:fontRef>
+        </p:style>
+        <p:txBody>
+          <a:bodyPr rtlCol="0" anchor="ctr"/>
+          <a:lstStyle/>
+          <a:p>
+            <a:pPr algn="ctr"/>
+            <a:r>
+              <a:rPr lang="en-US" sz="1400" dirty="0">
+                <a:ln w="0"/>
+                <a:solidFill>
+                  <a:schemeClr val="tx1"/>
+                </a:solidFill>
+                <a:effectLst>
+                  <a:outerShdw blurRad="38100" dist="19050" dir="2700000" algn="tl" rotWithShape="0">
+                    <a:schemeClr val="dk1">
+                      <a:alpha val="40000"/>
+                    </a:schemeClr>
+                  </a:outerShdw>
+                </a:effectLst>
+                <a:latin typeface="Helvetica Neue" panose="02000503000000020004" pitchFamily="2" charset="0"/>
+                <a:ea typeface="Helvetica Neue" panose="02000503000000020004" pitchFamily="2" charset="0"/>
+                <a:cs typeface="Helvetica Neue" panose="02000503000000020004" pitchFamily="2" charset="0"/>
+              </a:rPr>
+              <a:t>The project</a:t>
+            </a:r>
+          </a:p>
+        </p:txBody>
+      </p:sp>
+      <p:sp>
+        <p:nvSpPr>
+          <p:cNvPr id="3" name="Rectangle 2">
+            <a:extLst>
+              <a:ext uri="{FF2B5EF4-FFF2-40B4-BE49-F238E27FC236}">
+                <a16:creationId xmlns:a16="http://schemas.microsoft.com/office/drawing/2014/main" id="{5FD2B055-1CF7-C944-91EA-71A5DE661763}"/>
+              </a:ext>
+            </a:extLst>
+          </p:cNvPr>
+          <p:cNvSpPr/>
+          <p:nvPr/>
+        </p:nvSpPr>
+        <p:spPr>
+          <a:xfrm>
+            <a:off x="9344243" y="2183658"/>
+            <a:ext cx="2604977" cy="2490677"/>
+          </a:xfrm>
+          <a:prstGeom prst="rect">
+            <a:avLst/>
+          </a:prstGeom>
+          <a:solidFill>
+            <a:schemeClr val="bg2"/>
+          </a:solidFill>
+          <a:ln>
+            <a:noFill/>
+          </a:ln>
+        </p:spPr>
+        <p:style>
+          <a:lnRef idx="2">
+            <a:schemeClr val="accent1">
+              <a:shade val="50000"/>
+            </a:schemeClr>
+          </a:lnRef>
+          <a:fillRef idx="1">
+            <a:schemeClr val="accent1"/>
+          </a:fillRef>
+          <a:effectRef idx="0">
+            <a:schemeClr val="accent1"/>
+          </a:effectRef>
+          <a:fontRef idx="minor">
+            <a:schemeClr val="lt1"/>
+          </a:fontRef>
+        </p:style>
+        <p:txBody>
+          <a:bodyPr rtlCol="0" anchor="ctr"/>
+          <a:lstStyle/>
+          <a:p>
+            <a:pPr algn="ctr"/>
+            <a:r>
+              <a:rPr lang="en-US" dirty="0">
+                <a:solidFill>
+                  <a:schemeClr val="tx1"/>
+                </a:solidFill>
+                <a:latin typeface="Helvetica Neue" panose="02000503000000020004" pitchFamily="2" charset="0"/>
+                <a:ea typeface="Helvetica Neue" panose="02000503000000020004" pitchFamily="2" charset="0"/>
+                <a:cs typeface="Helvetica Neue" panose="02000503000000020004" pitchFamily="2" charset="0"/>
+              </a:rPr>
+              <a:t>Full Documentation</a:t>
+            </a:r>
+          </a:p>
+        </p:txBody>
+      </p:sp>
+      <p:cxnSp>
+        <p:nvCxnSpPr>
+          <p:cNvPr id="5" name="Straight Arrow Connector 4">
+            <a:extLst>
+              <a:ext uri="{FF2B5EF4-FFF2-40B4-BE49-F238E27FC236}">
+                <a16:creationId xmlns:a16="http://schemas.microsoft.com/office/drawing/2014/main" id="{A665726E-500A-7B45-8378-F42CC6F7B5F9}"/>
+              </a:ext>
+            </a:extLst>
+          </p:cNvPr>
+          <p:cNvCxnSpPr>
+            <a:cxnSpLocks/>
+            <a:stCxn id="2" idx="3"/>
+          </p:cNvCxnSpPr>
+          <p:nvPr/>
+        </p:nvCxnSpPr>
+        <p:spPr>
+          <a:xfrm flipV="1">
+            <a:off x="2145558" y="2580056"/>
+            <a:ext cx="1559002" cy="848943"/>
+          </a:xfrm>
+          <a:prstGeom prst="straightConnector1">
+            <a:avLst/>
+          </a:prstGeom>
+          <a:ln>
+            <a:tailEnd type="triangle"/>
+          </a:ln>
+        </p:spPr>
+        <p:style>
+          <a:lnRef idx="1">
+            <a:schemeClr val="dk1"/>
+          </a:lnRef>
+          <a:fillRef idx="0">
+            <a:schemeClr val="dk1"/>
+          </a:fillRef>
+          <a:effectRef idx="0">
+            <a:schemeClr val="dk1"/>
+          </a:effectRef>
+          <a:fontRef idx="minor">
+            <a:schemeClr val="tx1"/>
+          </a:fontRef>
+        </p:style>
+      </p:cxnSp>
+      <p:cxnSp>
+        <p:nvCxnSpPr>
+          <p:cNvPr id="11" name="Straight Arrow Connector 10">
+            <a:extLst>
+              <a:ext uri="{FF2B5EF4-FFF2-40B4-BE49-F238E27FC236}">
+                <a16:creationId xmlns:a16="http://schemas.microsoft.com/office/drawing/2014/main" id="{E87F76D8-384A-6247-A379-4DA47769865B}"/>
+              </a:ext>
+            </a:extLst>
+          </p:cNvPr>
+          <p:cNvCxnSpPr>
+            <a:cxnSpLocks/>
+            <a:stCxn id="2" idx="3"/>
+          </p:cNvCxnSpPr>
+          <p:nvPr/>
+        </p:nvCxnSpPr>
+        <p:spPr>
+          <a:xfrm>
+            <a:off x="2145558" y="3428999"/>
+            <a:ext cx="1559002" cy="848946"/>
+          </a:xfrm>
+          <a:prstGeom prst="straightConnector1">
+            <a:avLst/>
+          </a:prstGeom>
+          <a:ln>
+            <a:tailEnd type="triangle"/>
+          </a:ln>
+        </p:spPr>
+        <p:style>
+          <a:lnRef idx="1">
+            <a:schemeClr val="dk1"/>
+          </a:lnRef>
+          <a:fillRef idx="0">
+            <a:schemeClr val="dk1"/>
+          </a:fillRef>
+          <a:effectRef idx="0">
+            <a:schemeClr val="dk1"/>
+          </a:effectRef>
+          <a:fontRef idx="minor">
+            <a:schemeClr val="tx1"/>
+          </a:fontRef>
+        </p:style>
+      </p:cxnSp>
+      <p:cxnSp>
+        <p:nvCxnSpPr>
+          <p:cNvPr id="13" name="Straight Arrow Connector 12">
+            <a:extLst>
+              <a:ext uri="{FF2B5EF4-FFF2-40B4-BE49-F238E27FC236}">
+                <a16:creationId xmlns:a16="http://schemas.microsoft.com/office/drawing/2014/main" id="{A449C8B4-88D2-E54D-9CF3-19E4242F4B8E}"/>
+              </a:ext>
+            </a:extLst>
+          </p:cNvPr>
+          <p:cNvCxnSpPr>
+            <a:cxnSpLocks/>
+            <a:endCxn id="16" idx="1"/>
+          </p:cNvCxnSpPr>
+          <p:nvPr/>
+        </p:nvCxnSpPr>
+        <p:spPr>
+          <a:xfrm>
+            <a:off x="4202519" y="3428999"/>
+            <a:ext cx="786364" cy="0"/>
+          </a:xfrm>
+          <a:prstGeom prst="straightConnector1">
+            <a:avLst/>
+          </a:prstGeom>
+          <a:ln>
+            <a:tailEnd type="triangle"/>
+          </a:ln>
+        </p:spPr>
+        <p:style>
+          <a:lnRef idx="1">
+            <a:schemeClr val="dk1"/>
+          </a:lnRef>
+          <a:fillRef idx="0">
+            <a:schemeClr val="dk1"/>
+          </a:fillRef>
+          <a:effectRef idx="0">
+            <a:schemeClr val="dk1"/>
+          </a:effectRef>
+          <a:fontRef idx="minor">
+            <a:schemeClr val="tx1"/>
+          </a:fontRef>
+        </p:style>
+      </p:cxnSp>
+      <p:sp>
+        <p:nvSpPr>
+          <p:cNvPr id="16" name="Rectangle 15">
+            <a:extLst>
+              <a:ext uri="{FF2B5EF4-FFF2-40B4-BE49-F238E27FC236}">
+                <a16:creationId xmlns:a16="http://schemas.microsoft.com/office/drawing/2014/main" id="{9238EC61-E662-144A-B487-AE41A66F5645}"/>
+              </a:ext>
+            </a:extLst>
+          </p:cNvPr>
+          <p:cNvSpPr/>
+          <p:nvPr/>
+        </p:nvSpPr>
+        <p:spPr>
+          <a:xfrm>
+            <a:off x="4988883" y="2806329"/>
+            <a:ext cx="1604631" cy="1245339"/>
+          </a:xfrm>
+          <a:prstGeom prst="rect">
+            <a:avLst/>
+          </a:prstGeom>
+          <a:solidFill>
+            <a:schemeClr val="bg2"/>
+          </a:solidFill>
+          <a:ln>
+            <a:noFill/>
+          </a:ln>
+        </p:spPr>
+        <p:style>
+          <a:lnRef idx="2">
+            <a:schemeClr val="accent1">
+              <a:shade val="50000"/>
+            </a:schemeClr>
+          </a:lnRef>
+          <a:fillRef idx="1">
+            <a:schemeClr val="accent1"/>
+          </a:fillRef>
+          <a:effectRef idx="0">
+            <a:schemeClr val="accent1"/>
+          </a:effectRef>
+          <a:fontRef idx="minor">
+            <a:schemeClr val="lt1"/>
+          </a:fontRef>
+        </p:style>
+        <p:txBody>
+          <a:bodyPr rtlCol="0" anchor="ctr"/>
+          <a:lstStyle/>
+          <a:p>
+            <a:pPr algn="ctr"/>
+            <a:r>
+              <a:rPr lang="en-US" sz="1400" dirty="0">
+                <a:ln w="0"/>
+                <a:solidFill>
+                  <a:schemeClr val="tx1"/>
+                </a:solidFill>
+                <a:effectLst>
+                  <a:outerShdw blurRad="38100" dist="19050" dir="2700000" algn="tl" rotWithShape="0">
+                    <a:schemeClr val="dk1">
+                      <a:alpha val="40000"/>
+                    </a:schemeClr>
+                  </a:outerShdw>
+                </a:effectLst>
+                <a:latin typeface="Helvetica Neue" panose="02000503000000020004" pitchFamily="2" charset="0"/>
+                <a:ea typeface="Helvetica Neue" panose="02000503000000020004" pitchFamily="2" charset="0"/>
+                <a:cs typeface="Helvetica Neue" panose="02000503000000020004" pitchFamily="2" charset="0"/>
+              </a:rPr>
+              <a:t>We run a function that write the master documentation file in order</a:t>
+            </a:r>
+          </a:p>
+        </p:txBody>
+      </p:sp>
+      <p:cxnSp>
+        <p:nvCxnSpPr>
+          <p:cNvPr id="12" name="Straight Arrow Connector 11">
+            <a:extLst>
+              <a:ext uri="{FF2B5EF4-FFF2-40B4-BE49-F238E27FC236}">
+                <a16:creationId xmlns:a16="http://schemas.microsoft.com/office/drawing/2014/main" id="{907D21C7-21E9-D14D-B9F6-AE23F0D7BB71}"/>
+              </a:ext>
+            </a:extLst>
+          </p:cNvPr>
+          <p:cNvCxnSpPr>
+            <a:cxnSpLocks/>
+            <a:stCxn id="16" idx="3"/>
+            <a:endCxn id="14" idx="1"/>
+          </p:cNvCxnSpPr>
+          <p:nvPr/>
+        </p:nvCxnSpPr>
+        <p:spPr>
+          <a:xfrm flipV="1">
+            <a:off x="6593514" y="3428998"/>
+            <a:ext cx="573049" cy="1"/>
+          </a:xfrm>
+          <a:prstGeom prst="straightConnector1">
+            <a:avLst/>
+          </a:prstGeom>
+          <a:ln>
+            <a:tailEnd type="triangle"/>
+          </a:ln>
+        </p:spPr>
+        <p:style>
+          <a:lnRef idx="1">
+            <a:schemeClr val="dk1"/>
+          </a:lnRef>
+          <a:fillRef idx="0">
+            <a:schemeClr val="dk1"/>
+          </a:fillRef>
+          <a:effectRef idx="0">
+            <a:schemeClr val="dk1"/>
+          </a:effectRef>
+          <a:fontRef idx="minor">
+            <a:schemeClr val="tx1"/>
+          </a:fontRef>
+        </p:style>
+      </p:cxnSp>
+      <p:sp>
+        <p:nvSpPr>
+          <p:cNvPr id="14" name="Rectangle 13">
+            <a:extLst>
+              <a:ext uri="{FF2B5EF4-FFF2-40B4-BE49-F238E27FC236}">
+                <a16:creationId xmlns:a16="http://schemas.microsoft.com/office/drawing/2014/main" id="{17AFCF80-5B08-1F4E-9CAE-37CE5CE452A7}"/>
+              </a:ext>
+            </a:extLst>
+          </p:cNvPr>
+          <p:cNvSpPr/>
+          <p:nvPr/>
+        </p:nvSpPr>
+        <p:spPr>
+          <a:xfrm>
+            <a:off x="7166563" y="2806328"/>
+            <a:ext cx="1604631" cy="1245339"/>
+          </a:xfrm>
+          <a:prstGeom prst="rect">
+            <a:avLst/>
+          </a:prstGeom>
+          <a:solidFill>
+            <a:schemeClr val="bg2"/>
+          </a:solidFill>
+          <a:ln>
+            <a:noFill/>
+          </a:ln>
+        </p:spPr>
+        <p:style>
+          <a:lnRef idx="2">
+            <a:schemeClr val="accent1">
+              <a:shade val="50000"/>
+            </a:schemeClr>
+          </a:lnRef>
+          <a:fillRef idx="1">
+            <a:schemeClr val="accent1"/>
+          </a:fillRef>
+          <a:effectRef idx="0">
+            <a:schemeClr val="accent1"/>
+          </a:effectRef>
+          <a:fontRef idx="minor">
+            <a:schemeClr val="lt1"/>
+          </a:fontRef>
+        </p:style>
+        <p:txBody>
+          <a:bodyPr rtlCol="0" anchor="ctr"/>
+          <a:lstStyle/>
+          <a:p>
+            <a:pPr algn="ctr"/>
+            <a:r>
+              <a:rPr lang="en-US" sz="1400" dirty="0">
+                <a:ln w="0"/>
+                <a:solidFill>
+                  <a:schemeClr val="tx1"/>
+                </a:solidFill>
+                <a:effectLst>
+                  <a:outerShdw blurRad="38100" dist="19050" dir="2700000" algn="tl" rotWithShape="0">
+                    <a:schemeClr val="dk1">
+                      <a:alpha val="40000"/>
+                    </a:schemeClr>
+                  </a:outerShdw>
+                </a:effectLst>
+                <a:latin typeface="Helvetica Neue" panose="02000503000000020004" pitchFamily="2" charset="0"/>
+                <a:ea typeface="Helvetica Neue" panose="02000503000000020004" pitchFamily="2" charset="0"/>
+                <a:cs typeface="Helvetica Neue" panose="02000503000000020004" pitchFamily="2" charset="0"/>
+              </a:rPr>
+              <a:t>Implementation of the navigation index</a:t>
+            </a:r>
+          </a:p>
+        </p:txBody>
+      </p:sp>
+      <p:cxnSp>
+        <p:nvCxnSpPr>
+          <p:cNvPr id="17" name="Straight Arrow Connector 16">
+            <a:extLst>
+              <a:ext uri="{FF2B5EF4-FFF2-40B4-BE49-F238E27FC236}">
+                <a16:creationId xmlns:a16="http://schemas.microsoft.com/office/drawing/2014/main" id="{F7078773-7E8B-A545-B955-2BC726F5DE4C}"/>
+              </a:ext>
+            </a:extLst>
+          </p:cNvPr>
+          <p:cNvCxnSpPr>
+            <a:cxnSpLocks/>
+            <a:stCxn id="14" idx="3"/>
+            <a:endCxn id="3" idx="1"/>
+          </p:cNvCxnSpPr>
+          <p:nvPr/>
+        </p:nvCxnSpPr>
+        <p:spPr>
+          <a:xfrm flipV="1">
+            <a:off x="8771194" y="3428997"/>
+            <a:ext cx="573049" cy="1"/>
+          </a:xfrm>
+          <a:prstGeom prst="straightConnector1">
+            <a:avLst/>
+          </a:prstGeom>
+          <a:ln>
+            <a:tailEnd type="triangle"/>
+          </a:ln>
+        </p:spPr>
+        <p:style>
+          <a:lnRef idx="1">
+            <a:schemeClr val="dk1"/>
+          </a:lnRef>
+          <a:fillRef idx="0">
+            <a:schemeClr val="dk1"/>
+          </a:fillRef>
+          <a:effectRef idx="0">
+            <a:schemeClr val="dk1"/>
+          </a:effectRef>
+          <a:fontRef idx="minor">
+            <a:schemeClr val="tx1"/>
+          </a:fontRef>
+        </p:style>
+      </p:cxnSp>
+    </p:spTree>
+    <p:extLst>
+      <p:ext uri="{BB962C8B-B14F-4D97-AF65-F5344CB8AC3E}">
+        <p14:creationId xmlns:p14="http://schemas.microsoft.com/office/powerpoint/2010/main" val="527816987"/>
+      </p:ext>
+    </p:extLst>
+  </p:cSld>
+  <p:clrMapOvr>
+    <a:masterClrMapping/>
+  </p:clrMapOvr>
   <mc:AlternateContent xmlns:mc="http://schemas.openxmlformats.org/markup-compatibility/2006">
     <mc:Choice xmlns:p159="http://schemas.microsoft.com/office/powerpoint/2015/09/main" Requires="p159">
       <p:transition xmlns:p14="http://schemas.microsoft.com/office/powerpoint/2010/main" spd="slow" p14:dur="2000">
@@ -11632,13 +15233,13 @@
   <p:clrMapOvr>
     <a:masterClrMapping/>
   </p:clrMapOvr>
-  <mc:AlternateContent xmlns:mc="http://schemas.openxmlformats.org/markup-compatibility/2006">
-    <mc:Choice xmlns:p159="http://schemas.microsoft.com/office/powerpoint/2015/09/main" Requires="p159">
+  <mc:AlternateContent xmlns:mc="http://schemas.openxmlformats.org/markup-compatibility/2006" xmlns:p159="http://schemas.microsoft.com/office/powerpoint/2015/09/main">
+    <mc:Choice Requires="p159">
       <p:transition xmlns:p14="http://schemas.microsoft.com/office/powerpoint/2010/main" spd="slow" p14:dur="2000">
         <p159:morph option="byObject"/>
       </p:transition>
     </mc:Choice>
-    <mc:Fallback>
+    <mc:Fallback xmlns="">
       <p:transition spd="slow">
         <p:fade/>
       </p:transition>
@@ -13934,13 +17535,13 @@
   <p:clrMapOvr>
     <a:masterClrMapping/>
   </p:clrMapOvr>
-  <mc:AlternateContent xmlns:mc="http://schemas.openxmlformats.org/markup-compatibility/2006">
-    <mc:Choice xmlns:p159="http://schemas.microsoft.com/office/powerpoint/2015/09/main" Requires="p159">
+  <mc:AlternateContent xmlns:mc="http://schemas.openxmlformats.org/markup-compatibility/2006" xmlns:p159="http://schemas.microsoft.com/office/powerpoint/2015/09/main">
+    <mc:Choice Requires="p159">
       <p:transition xmlns:p14="http://schemas.microsoft.com/office/powerpoint/2010/main" spd="slow" p14:dur="2000">
         <p159:morph option="byObject"/>
       </p:transition>
     </mc:Choice>
-    <mc:Fallback>
+    <mc:Fallback xmlns="">
       <p:transition spd="slow">
         <p:fade/>
       </p:transition>

</xml_diff>